<commit_message>
update to MS intro
</commit_message>
<xml_diff>
--- a/artedi-light-preliminary-data.pptx
+++ b/artedi-light-preliminary-data.pptx
@@ -200,7 +200,7 @@
           <a:p>
             <a:fld id="{4FA24A9E-9394-7942-A592-6D05EAC7518C}" type="datetimeFigureOut">
               <a:rPr lang="en-US" smtClean="0"/>
-              <a:t>7/30/20</a:t>
+              <a:t>11/30/20</a:t>
             </a:fld>
             <a:endParaRPr lang="en-US"/>
           </a:p>
@@ -494,7 +494,12 @@
             <p:ph type="sldImg"/>
           </p:nvPr>
         </p:nvSpPr>
-        <p:spPr/>
+        <p:spPr>
+          <a:xfrm>
+            <a:off x="685800" y="1143000"/>
+            <a:ext cx="5486400" cy="3086100"/>
+          </a:xfrm>
+        </p:spPr>
       </p:sp>
       <p:sp>
         <p:nvSpPr>
@@ -581,7 +586,12 @@
             <p:ph type="sldImg"/>
           </p:nvPr>
         </p:nvSpPr>
-        <p:spPr/>
+        <p:spPr>
+          <a:xfrm>
+            <a:off x="685800" y="1143000"/>
+            <a:ext cx="5486400" cy="3086100"/>
+          </a:xfrm>
+        </p:spPr>
       </p:sp>
       <p:sp>
         <p:nvSpPr>
@@ -913,35 +923,35 @@
               <a:buNone/>
               <a:defRPr sz="2400"/>
             </a:lvl1pPr>
-            <a:lvl2pPr marL="457200" indent="0" algn="ctr">
+            <a:lvl2pPr marL="457206" indent="0" algn="ctr">
               <a:buNone/>
               <a:defRPr sz="2000"/>
             </a:lvl2pPr>
-            <a:lvl3pPr marL="914400" indent="0" algn="ctr">
+            <a:lvl3pPr marL="914411" indent="0" algn="ctr">
               <a:buNone/>
               <a:defRPr sz="1800"/>
             </a:lvl3pPr>
-            <a:lvl4pPr marL="1371600" indent="0" algn="ctr">
+            <a:lvl4pPr marL="1371617" indent="0" algn="ctr">
               <a:buNone/>
               <a:defRPr sz="1600"/>
             </a:lvl4pPr>
-            <a:lvl5pPr marL="1828800" indent="0" algn="ctr">
+            <a:lvl5pPr marL="1828823" indent="0" algn="ctr">
               <a:buNone/>
               <a:defRPr sz="1600"/>
             </a:lvl5pPr>
-            <a:lvl6pPr marL="2286000" indent="0" algn="ctr">
+            <a:lvl6pPr marL="2286029" indent="0" algn="ctr">
               <a:buNone/>
               <a:defRPr sz="1600"/>
             </a:lvl6pPr>
-            <a:lvl7pPr marL="2743200" indent="0" algn="ctr">
+            <a:lvl7pPr marL="2743234" indent="0" algn="ctr">
               <a:buNone/>
               <a:defRPr sz="1600"/>
             </a:lvl7pPr>
-            <a:lvl8pPr marL="3200400" indent="0" algn="ctr">
+            <a:lvl8pPr marL="3200440" indent="0" algn="ctr">
               <a:buNone/>
               <a:defRPr sz="1600"/>
             </a:lvl8pPr>
-            <a:lvl9pPr marL="3657600" indent="0" algn="ctr">
+            <a:lvl9pPr marL="3657646" indent="0" algn="ctr">
               <a:buNone/>
               <a:defRPr sz="1600"/>
             </a:lvl9pPr>
@@ -977,7 +987,7 @@
           <a:p>
             <a:fld id="{2F86B573-D929-4C41-8751-A8F006DF5B16}" type="datetimeFigureOut">
               <a:rPr lang="en-US" smtClean="0"/>
-              <a:t>7/30/20</a:t>
+              <a:t>11/30/20</a:t>
             </a:fld>
             <a:endParaRPr lang="en-US"/>
           </a:p>
@@ -1175,7 +1185,7 @@
           <a:p>
             <a:fld id="{2F86B573-D929-4C41-8751-A8F006DF5B16}" type="datetimeFigureOut">
               <a:rPr lang="en-US" smtClean="0"/>
-              <a:t>7/30/20</a:t>
+              <a:t>11/30/20</a:t>
             </a:fld>
             <a:endParaRPr lang="en-US"/>
           </a:p>
@@ -1283,7 +1293,7 @@
         </p:nvSpPr>
         <p:spPr>
           <a:xfrm>
-            <a:off x="8724900" y="365125"/>
+            <a:off x="8724899" y="365125"/>
             <a:ext cx="2628900" cy="5811838"/>
           </a:xfrm>
         </p:spPr>
@@ -1316,7 +1326,7 @@
         </p:nvSpPr>
         <p:spPr>
           <a:xfrm>
-            <a:off x="838200" y="365125"/>
+            <a:off x="838199" y="365125"/>
             <a:ext cx="7734300" cy="5811838"/>
           </a:xfrm>
         </p:spPr>
@@ -1383,7 +1393,7 @@
           <a:p>
             <a:fld id="{2F86B573-D929-4C41-8751-A8F006DF5B16}" type="datetimeFigureOut">
               <a:rPr lang="en-US" smtClean="0"/>
-              <a:t>7/30/20</a:t>
+              <a:t>11/30/20</a:t>
             </a:fld>
             <a:endParaRPr lang="en-US"/>
           </a:p>
@@ -1581,7 +1591,7 @@
           <a:p>
             <a:fld id="{2F86B573-D929-4C41-8751-A8F006DF5B16}" type="datetimeFigureOut">
               <a:rPr lang="en-US" smtClean="0"/>
-              <a:t>7/30/20</a:t>
+              <a:t>11/30/20</a:t>
             </a:fld>
             <a:endParaRPr lang="en-US"/>
           </a:p>
@@ -1689,7 +1699,7 @@
         </p:nvSpPr>
         <p:spPr>
           <a:xfrm>
-            <a:off x="831850" y="1709738"/>
+            <a:off x="831852" y="1709738"/>
             <a:ext cx="10515600" cy="2852737"/>
           </a:xfrm>
         </p:spPr>
@@ -1726,7 +1736,7 @@
         </p:nvSpPr>
         <p:spPr>
           <a:xfrm>
-            <a:off x="831850" y="4589463"/>
+            <a:off x="831852" y="4589464"/>
             <a:ext cx="10515600" cy="1500187"/>
           </a:xfrm>
         </p:spPr>
@@ -1743,7 +1753,7 @@
                 </a:solidFill>
               </a:defRPr>
             </a:lvl1pPr>
-            <a:lvl2pPr marL="457200" indent="0">
+            <a:lvl2pPr marL="457206" indent="0">
               <a:buNone/>
               <a:defRPr sz="2000">
                 <a:solidFill>
@@ -1753,7 +1763,7 @@
                 </a:solidFill>
               </a:defRPr>
             </a:lvl2pPr>
-            <a:lvl3pPr marL="914400" indent="0">
+            <a:lvl3pPr marL="914411" indent="0">
               <a:buNone/>
               <a:defRPr sz="1800">
                 <a:solidFill>
@@ -1763,7 +1773,7 @@
                 </a:solidFill>
               </a:defRPr>
             </a:lvl3pPr>
-            <a:lvl4pPr marL="1371600" indent="0">
+            <a:lvl4pPr marL="1371617" indent="0">
               <a:buNone/>
               <a:defRPr sz="1600">
                 <a:solidFill>
@@ -1773,7 +1783,7 @@
                 </a:solidFill>
               </a:defRPr>
             </a:lvl4pPr>
-            <a:lvl5pPr marL="1828800" indent="0">
+            <a:lvl5pPr marL="1828823" indent="0">
               <a:buNone/>
               <a:defRPr sz="1600">
                 <a:solidFill>
@@ -1783,7 +1793,7 @@
                 </a:solidFill>
               </a:defRPr>
             </a:lvl5pPr>
-            <a:lvl6pPr marL="2286000" indent="0">
+            <a:lvl6pPr marL="2286029" indent="0">
               <a:buNone/>
               <a:defRPr sz="1600">
                 <a:solidFill>
@@ -1793,7 +1803,7 @@
                 </a:solidFill>
               </a:defRPr>
             </a:lvl6pPr>
-            <a:lvl7pPr marL="2743200" indent="0">
+            <a:lvl7pPr marL="2743234" indent="0">
               <a:buNone/>
               <a:defRPr sz="1600">
                 <a:solidFill>
@@ -1803,7 +1813,7 @@
                 </a:solidFill>
               </a:defRPr>
             </a:lvl7pPr>
-            <a:lvl8pPr marL="3200400" indent="0">
+            <a:lvl8pPr marL="3200440" indent="0">
               <a:buNone/>
               <a:defRPr sz="1600">
                 <a:solidFill>
@@ -1813,7 +1823,7 @@
                 </a:solidFill>
               </a:defRPr>
             </a:lvl8pPr>
-            <a:lvl9pPr marL="3657600" indent="0">
+            <a:lvl9pPr marL="3657646" indent="0">
               <a:buNone/>
               <a:defRPr sz="1600">
                 <a:solidFill>
@@ -1856,7 +1866,7 @@
           <a:p>
             <a:fld id="{2F86B573-D929-4C41-8751-A8F006DF5B16}" type="datetimeFigureOut">
               <a:rPr lang="en-US" smtClean="0"/>
-              <a:t>7/30/20</a:t>
+              <a:t>11/30/20</a:t>
             </a:fld>
             <a:endParaRPr lang="en-US"/>
           </a:p>
@@ -1992,7 +2002,7 @@
         </p:nvSpPr>
         <p:spPr>
           <a:xfrm>
-            <a:off x="838200" y="1825625"/>
+            <a:off x="838201" y="1825625"/>
             <a:ext cx="5181600" cy="4351338"/>
           </a:xfrm>
         </p:spPr>
@@ -2054,7 +2064,7 @@
         </p:nvSpPr>
         <p:spPr>
           <a:xfrm>
-            <a:off x="6172200" y="1825625"/>
+            <a:off x="6172201" y="1825625"/>
             <a:ext cx="5181600" cy="4351338"/>
           </a:xfrm>
         </p:spPr>
@@ -2121,7 +2131,7 @@
           <a:p>
             <a:fld id="{2F86B573-D929-4C41-8751-A8F006DF5B16}" type="datetimeFigureOut">
               <a:rPr lang="en-US" smtClean="0"/>
-              <a:t>7/30/20</a:t>
+              <a:t>11/30/20</a:t>
             </a:fld>
             <a:endParaRPr lang="en-US"/>
           </a:p>
@@ -2229,7 +2239,7 @@
         </p:nvSpPr>
         <p:spPr>
           <a:xfrm>
-            <a:off x="839788" y="365125"/>
+            <a:off x="839789" y="365125"/>
             <a:ext cx="10515600" cy="1325563"/>
           </a:xfrm>
         </p:spPr>
@@ -2262,7 +2272,7 @@
         </p:nvSpPr>
         <p:spPr>
           <a:xfrm>
-            <a:off x="839788" y="1681163"/>
+            <a:off x="839789" y="1681163"/>
             <a:ext cx="5157787" cy="823912"/>
           </a:xfrm>
         </p:spPr>
@@ -2273,35 +2283,35 @@
               <a:buNone/>
               <a:defRPr sz="2400" b="1"/>
             </a:lvl1pPr>
-            <a:lvl2pPr marL="457200" indent="0">
+            <a:lvl2pPr marL="457206" indent="0">
               <a:buNone/>
               <a:defRPr sz="2000" b="1"/>
             </a:lvl2pPr>
-            <a:lvl3pPr marL="914400" indent="0">
+            <a:lvl3pPr marL="914411" indent="0">
               <a:buNone/>
               <a:defRPr sz="1800" b="1"/>
             </a:lvl3pPr>
-            <a:lvl4pPr marL="1371600" indent="0">
+            <a:lvl4pPr marL="1371617" indent="0">
               <a:buNone/>
               <a:defRPr sz="1600" b="1"/>
             </a:lvl4pPr>
-            <a:lvl5pPr marL="1828800" indent="0">
+            <a:lvl5pPr marL="1828823" indent="0">
               <a:buNone/>
               <a:defRPr sz="1600" b="1"/>
             </a:lvl5pPr>
-            <a:lvl6pPr marL="2286000" indent="0">
+            <a:lvl6pPr marL="2286029" indent="0">
               <a:buNone/>
               <a:defRPr sz="1600" b="1"/>
             </a:lvl6pPr>
-            <a:lvl7pPr marL="2743200" indent="0">
+            <a:lvl7pPr marL="2743234" indent="0">
               <a:buNone/>
               <a:defRPr sz="1600" b="1"/>
             </a:lvl7pPr>
-            <a:lvl8pPr marL="3200400" indent="0">
+            <a:lvl8pPr marL="3200440" indent="0">
               <a:buNone/>
               <a:defRPr sz="1600" b="1"/>
             </a:lvl8pPr>
-            <a:lvl9pPr marL="3657600" indent="0">
+            <a:lvl9pPr marL="3657646" indent="0">
               <a:buNone/>
               <a:defRPr sz="1600" b="1"/>
             </a:lvl9pPr>
@@ -2333,7 +2343,7 @@
         </p:nvSpPr>
         <p:spPr>
           <a:xfrm>
-            <a:off x="839788" y="2505075"/>
+            <a:off x="839789" y="2505076"/>
             <a:ext cx="5157787" cy="3684588"/>
           </a:xfrm>
         </p:spPr>
@@ -2395,7 +2405,7 @@
         </p:nvSpPr>
         <p:spPr>
           <a:xfrm>
-            <a:off x="6172200" y="1681163"/>
+            <a:off x="6172202" y="1681163"/>
             <a:ext cx="5183188" cy="823912"/>
           </a:xfrm>
         </p:spPr>
@@ -2406,35 +2416,35 @@
               <a:buNone/>
               <a:defRPr sz="2400" b="1"/>
             </a:lvl1pPr>
-            <a:lvl2pPr marL="457200" indent="0">
+            <a:lvl2pPr marL="457206" indent="0">
               <a:buNone/>
               <a:defRPr sz="2000" b="1"/>
             </a:lvl2pPr>
-            <a:lvl3pPr marL="914400" indent="0">
+            <a:lvl3pPr marL="914411" indent="0">
               <a:buNone/>
               <a:defRPr sz="1800" b="1"/>
             </a:lvl3pPr>
-            <a:lvl4pPr marL="1371600" indent="0">
+            <a:lvl4pPr marL="1371617" indent="0">
               <a:buNone/>
               <a:defRPr sz="1600" b="1"/>
             </a:lvl4pPr>
-            <a:lvl5pPr marL="1828800" indent="0">
+            <a:lvl5pPr marL="1828823" indent="0">
               <a:buNone/>
               <a:defRPr sz="1600" b="1"/>
             </a:lvl5pPr>
-            <a:lvl6pPr marL="2286000" indent="0">
+            <a:lvl6pPr marL="2286029" indent="0">
               <a:buNone/>
               <a:defRPr sz="1600" b="1"/>
             </a:lvl6pPr>
-            <a:lvl7pPr marL="2743200" indent="0">
+            <a:lvl7pPr marL="2743234" indent="0">
               <a:buNone/>
               <a:defRPr sz="1600" b="1"/>
             </a:lvl7pPr>
-            <a:lvl8pPr marL="3200400" indent="0">
+            <a:lvl8pPr marL="3200440" indent="0">
               <a:buNone/>
               <a:defRPr sz="1600" b="1"/>
             </a:lvl8pPr>
-            <a:lvl9pPr marL="3657600" indent="0">
+            <a:lvl9pPr marL="3657646" indent="0">
               <a:buNone/>
               <a:defRPr sz="1600" b="1"/>
             </a:lvl9pPr>
@@ -2466,7 +2476,7 @@
         </p:nvSpPr>
         <p:spPr>
           <a:xfrm>
-            <a:off x="6172200" y="2505075"/>
+            <a:off x="6172202" y="2505076"/>
             <a:ext cx="5183188" cy="3684588"/>
           </a:xfrm>
         </p:spPr>
@@ -2533,7 +2543,7 @@
           <a:p>
             <a:fld id="{2F86B573-D929-4C41-8751-A8F006DF5B16}" type="datetimeFigureOut">
               <a:rPr lang="en-US" smtClean="0"/>
-              <a:t>7/30/20</a:t>
+              <a:t>11/30/20</a:t>
             </a:fld>
             <a:endParaRPr lang="en-US"/>
           </a:p>
@@ -2674,7 +2684,7 @@
           <a:p>
             <a:fld id="{2F86B573-D929-4C41-8751-A8F006DF5B16}" type="datetimeFigureOut">
               <a:rPr lang="en-US" smtClean="0"/>
-              <a:t>7/30/20</a:t>
+              <a:t>11/30/20</a:t>
             </a:fld>
             <a:endParaRPr lang="en-US"/>
           </a:p>
@@ -2787,7 +2797,7 @@
           <a:p>
             <a:fld id="{2F86B573-D929-4C41-8751-A8F006DF5B16}" type="datetimeFigureOut">
               <a:rPr lang="en-US" smtClean="0"/>
-              <a:t>7/30/20</a:t>
+              <a:t>11/30/20</a:t>
             </a:fld>
             <a:endParaRPr lang="en-US"/>
           </a:p>
@@ -2895,8 +2905,8 @@
         </p:nvSpPr>
         <p:spPr>
           <a:xfrm>
-            <a:off x="839788" y="457200"/>
-            <a:ext cx="3932237" cy="1600200"/>
+            <a:off x="839790" y="457200"/>
+            <a:ext cx="3932236" cy="1600200"/>
           </a:xfrm>
         </p:spPr>
         <p:txBody>
@@ -2933,7 +2943,7 @@
         <p:spPr>
           <a:xfrm>
             <a:off x="5183188" y="987425"/>
-            <a:ext cx="6172200" cy="4873625"/>
+            <a:ext cx="6172201" cy="4873625"/>
           </a:xfrm>
         </p:spPr>
         <p:txBody>
@@ -3022,8 +3032,8 @@
         </p:nvSpPr>
         <p:spPr>
           <a:xfrm>
-            <a:off x="839788" y="2057400"/>
-            <a:ext cx="3932237" cy="3811588"/>
+            <a:off x="839790" y="2057400"/>
+            <a:ext cx="3932236" cy="3811588"/>
           </a:xfrm>
         </p:spPr>
         <p:txBody>
@@ -3033,35 +3043,35 @@
               <a:buNone/>
               <a:defRPr sz="1600"/>
             </a:lvl1pPr>
-            <a:lvl2pPr marL="457200" indent="0">
+            <a:lvl2pPr marL="457206" indent="0">
               <a:buNone/>
               <a:defRPr sz="1400"/>
             </a:lvl2pPr>
-            <a:lvl3pPr marL="914400" indent="0">
+            <a:lvl3pPr marL="914411" indent="0">
               <a:buNone/>
               <a:defRPr sz="1200"/>
             </a:lvl3pPr>
-            <a:lvl4pPr marL="1371600" indent="0">
+            <a:lvl4pPr marL="1371617" indent="0">
               <a:buNone/>
               <a:defRPr sz="1000"/>
             </a:lvl4pPr>
-            <a:lvl5pPr marL="1828800" indent="0">
+            <a:lvl5pPr marL="1828823" indent="0">
               <a:buNone/>
               <a:defRPr sz="1000"/>
             </a:lvl5pPr>
-            <a:lvl6pPr marL="2286000" indent="0">
+            <a:lvl6pPr marL="2286029" indent="0">
               <a:buNone/>
               <a:defRPr sz="1000"/>
             </a:lvl6pPr>
-            <a:lvl7pPr marL="2743200" indent="0">
+            <a:lvl7pPr marL="2743234" indent="0">
               <a:buNone/>
               <a:defRPr sz="1000"/>
             </a:lvl7pPr>
-            <a:lvl8pPr marL="3200400" indent="0">
+            <a:lvl8pPr marL="3200440" indent="0">
               <a:buNone/>
               <a:defRPr sz="1000"/>
             </a:lvl8pPr>
-            <a:lvl9pPr marL="3657600" indent="0">
+            <a:lvl9pPr marL="3657646" indent="0">
               <a:buNone/>
               <a:defRPr sz="1000"/>
             </a:lvl9pPr>
@@ -3098,7 +3108,7 @@
           <a:p>
             <a:fld id="{2F86B573-D929-4C41-8751-A8F006DF5B16}" type="datetimeFigureOut">
               <a:rPr lang="en-US" smtClean="0"/>
-              <a:t>7/30/20</a:t>
+              <a:t>11/30/20</a:t>
             </a:fld>
             <a:endParaRPr lang="en-US"/>
           </a:p>
@@ -3206,8 +3216,8 @@
         </p:nvSpPr>
         <p:spPr>
           <a:xfrm>
-            <a:off x="839788" y="457200"/>
-            <a:ext cx="3932237" cy="1600200"/>
+            <a:off x="839790" y="457200"/>
+            <a:ext cx="3932236" cy="1600200"/>
           </a:xfrm>
         </p:spPr>
         <p:txBody>
@@ -3244,7 +3254,7 @@
         <p:spPr>
           <a:xfrm>
             <a:off x="5183188" y="987425"/>
-            <a:ext cx="6172200" cy="4873625"/>
+            <a:ext cx="6172201" cy="4873625"/>
           </a:xfrm>
         </p:spPr>
         <p:txBody>
@@ -3254,35 +3264,35 @@
               <a:buNone/>
               <a:defRPr sz="3200"/>
             </a:lvl1pPr>
-            <a:lvl2pPr marL="457200" indent="0">
+            <a:lvl2pPr marL="457206" indent="0">
               <a:buNone/>
               <a:defRPr sz="2800"/>
             </a:lvl2pPr>
-            <a:lvl3pPr marL="914400" indent="0">
+            <a:lvl3pPr marL="914411" indent="0">
               <a:buNone/>
               <a:defRPr sz="2400"/>
             </a:lvl3pPr>
-            <a:lvl4pPr marL="1371600" indent="0">
+            <a:lvl4pPr marL="1371617" indent="0">
               <a:buNone/>
               <a:defRPr sz="2000"/>
             </a:lvl4pPr>
-            <a:lvl5pPr marL="1828800" indent="0">
+            <a:lvl5pPr marL="1828823" indent="0">
               <a:buNone/>
               <a:defRPr sz="2000"/>
             </a:lvl5pPr>
-            <a:lvl6pPr marL="2286000" indent="0">
+            <a:lvl6pPr marL="2286029" indent="0">
               <a:buNone/>
               <a:defRPr sz="2000"/>
             </a:lvl6pPr>
-            <a:lvl7pPr marL="2743200" indent="0">
+            <a:lvl7pPr marL="2743234" indent="0">
               <a:buNone/>
               <a:defRPr sz="2000"/>
             </a:lvl7pPr>
-            <a:lvl8pPr marL="3200400" indent="0">
+            <a:lvl8pPr marL="3200440" indent="0">
               <a:buNone/>
               <a:defRPr sz="2000"/>
             </a:lvl8pPr>
-            <a:lvl9pPr marL="3657600" indent="0">
+            <a:lvl9pPr marL="3657646" indent="0">
               <a:buNone/>
               <a:defRPr sz="2000"/>
             </a:lvl9pPr>
@@ -3310,8 +3320,8 @@
         </p:nvSpPr>
         <p:spPr>
           <a:xfrm>
-            <a:off x="839788" y="2057400"/>
-            <a:ext cx="3932237" cy="3811588"/>
+            <a:off x="839790" y="2057400"/>
+            <a:ext cx="3932236" cy="3811588"/>
           </a:xfrm>
         </p:spPr>
         <p:txBody>
@@ -3321,35 +3331,35 @@
               <a:buNone/>
               <a:defRPr sz="1600"/>
             </a:lvl1pPr>
-            <a:lvl2pPr marL="457200" indent="0">
+            <a:lvl2pPr marL="457206" indent="0">
               <a:buNone/>
               <a:defRPr sz="1400"/>
             </a:lvl2pPr>
-            <a:lvl3pPr marL="914400" indent="0">
+            <a:lvl3pPr marL="914411" indent="0">
               <a:buNone/>
               <a:defRPr sz="1200"/>
             </a:lvl3pPr>
-            <a:lvl4pPr marL="1371600" indent="0">
+            <a:lvl4pPr marL="1371617" indent="0">
               <a:buNone/>
               <a:defRPr sz="1000"/>
             </a:lvl4pPr>
-            <a:lvl5pPr marL="1828800" indent="0">
+            <a:lvl5pPr marL="1828823" indent="0">
               <a:buNone/>
               <a:defRPr sz="1000"/>
             </a:lvl5pPr>
-            <a:lvl6pPr marL="2286000" indent="0">
+            <a:lvl6pPr marL="2286029" indent="0">
               <a:buNone/>
               <a:defRPr sz="1000"/>
             </a:lvl6pPr>
-            <a:lvl7pPr marL="2743200" indent="0">
+            <a:lvl7pPr marL="2743234" indent="0">
               <a:buNone/>
               <a:defRPr sz="1000"/>
             </a:lvl7pPr>
-            <a:lvl8pPr marL="3200400" indent="0">
+            <a:lvl8pPr marL="3200440" indent="0">
               <a:buNone/>
               <a:defRPr sz="1000"/>
             </a:lvl8pPr>
-            <a:lvl9pPr marL="3657600" indent="0">
+            <a:lvl9pPr marL="3657646" indent="0">
               <a:buNone/>
               <a:defRPr sz="1000"/>
             </a:lvl9pPr>
@@ -3386,7 +3396,7 @@
           <a:p>
             <a:fld id="{2F86B573-D929-4C41-8751-A8F006DF5B16}" type="datetimeFigureOut">
               <a:rPr lang="en-US" smtClean="0"/>
-              <a:t>7/30/20</a:t>
+              <a:t>11/30/20</a:t>
             </a:fld>
             <a:endParaRPr lang="en-US"/>
           </a:p>
@@ -3499,7 +3509,7 @@
         </p:nvSpPr>
         <p:spPr>
           <a:xfrm>
-            <a:off x="838200" y="365125"/>
+            <a:off x="838202" y="365125"/>
             <a:ext cx="10515600" cy="1325563"/>
           </a:xfrm>
           <a:prstGeom prst="rect">
@@ -3537,7 +3547,7 @@
         </p:nvSpPr>
         <p:spPr>
           <a:xfrm>
-            <a:off x="838200" y="1825625"/>
+            <a:off x="838202" y="1825625"/>
             <a:ext cx="10515600" cy="4351338"/>
           </a:xfrm>
           <a:prstGeom prst="rect">
@@ -3604,7 +3614,7 @@
         </p:nvSpPr>
         <p:spPr>
           <a:xfrm>
-            <a:off x="838200" y="6356350"/>
+            <a:off x="838201" y="6356351"/>
             <a:ext cx="2743200" cy="365125"/>
           </a:xfrm>
           <a:prstGeom prst="rect">
@@ -3627,7 +3637,7 @@
           <a:p>
             <a:fld id="{2F86B573-D929-4C41-8751-A8F006DF5B16}" type="datetimeFigureOut">
               <a:rPr lang="en-US" smtClean="0"/>
-              <a:t>7/30/20</a:t>
+              <a:t>11/30/20</a:t>
             </a:fld>
             <a:endParaRPr lang="en-US"/>
           </a:p>
@@ -3651,7 +3661,7 @@
         </p:nvSpPr>
         <p:spPr>
           <a:xfrm>
-            <a:off x="4038600" y="6356350"/>
+            <a:off x="4038602" y="6356351"/>
             <a:ext cx="4114800" cy="365125"/>
           </a:xfrm>
           <a:prstGeom prst="rect">
@@ -3694,7 +3704,7 @@
         </p:nvSpPr>
         <p:spPr>
           <a:xfrm>
-            <a:off x="8610600" y="6356350"/>
+            <a:off x="8610601" y="6356351"/>
             <a:ext cx="2743200" cy="365125"/>
           </a:xfrm>
           <a:prstGeom prst="rect">
@@ -3746,7 +3756,7 @@
   </p:sldLayoutIdLst>
   <p:txStyles>
     <p:titleStyle>
-      <a:lvl1pPr algn="l" defTabSz="914400" rtl="0" eaLnBrk="1" latinLnBrk="0" hangingPunct="1">
+      <a:lvl1pPr algn="l" defTabSz="914411" rtl="0" eaLnBrk="1" latinLnBrk="0" hangingPunct="1">
         <a:lnSpc>
           <a:spcPct val="90000"/>
         </a:lnSpc>
@@ -3765,7 +3775,7 @@
       </a:lvl1pPr>
     </p:titleStyle>
     <p:bodyStyle>
-      <a:lvl1pPr marL="228600" indent="-228600" algn="l" defTabSz="914400" rtl="0" eaLnBrk="1" latinLnBrk="0" hangingPunct="1">
+      <a:lvl1pPr marL="228603" indent="-228603" algn="l" defTabSz="914411" rtl="0" eaLnBrk="1" latinLnBrk="0" hangingPunct="1">
         <a:lnSpc>
           <a:spcPct val="90000"/>
         </a:lnSpc>
@@ -3783,7 +3793,7 @@
           <a:cs typeface="+mn-cs"/>
         </a:defRPr>
       </a:lvl1pPr>
-      <a:lvl2pPr marL="685800" indent="-228600" algn="l" defTabSz="914400" rtl="0" eaLnBrk="1" latinLnBrk="0" hangingPunct="1">
+      <a:lvl2pPr marL="685808" indent="-228603" algn="l" defTabSz="914411" rtl="0" eaLnBrk="1" latinLnBrk="0" hangingPunct="1">
         <a:lnSpc>
           <a:spcPct val="90000"/>
         </a:lnSpc>
@@ -3801,7 +3811,7 @@
           <a:cs typeface="+mn-cs"/>
         </a:defRPr>
       </a:lvl2pPr>
-      <a:lvl3pPr marL="1143000" indent="-228600" algn="l" defTabSz="914400" rtl="0" eaLnBrk="1" latinLnBrk="0" hangingPunct="1">
+      <a:lvl3pPr marL="1143014" indent="-228603" algn="l" defTabSz="914411" rtl="0" eaLnBrk="1" latinLnBrk="0" hangingPunct="1">
         <a:lnSpc>
           <a:spcPct val="90000"/>
         </a:lnSpc>
@@ -3819,7 +3829,7 @@
           <a:cs typeface="+mn-cs"/>
         </a:defRPr>
       </a:lvl3pPr>
-      <a:lvl4pPr marL="1600200" indent="-228600" algn="l" defTabSz="914400" rtl="0" eaLnBrk="1" latinLnBrk="0" hangingPunct="1">
+      <a:lvl4pPr marL="1600220" indent="-228603" algn="l" defTabSz="914411" rtl="0" eaLnBrk="1" latinLnBrk="0" hangingPunct="1">
         <a:lnSpc>
           <a:spcPct val="90000"/>
         </a:lnSpc>
@@ -3837,7 +3847,7 @@
           <a:cs typeface="+mn-cs"/>
         </a:defRPr>
       </a:lvl4pPr>
-      <a:lvl5pPr marL="2057400" indent="-228600" algn="l" defTabSz="914400" rtl="0" eaLnBrk="1" latinLnBrk="0" hangingPunct="1">
+      <a:lvl5pPr marL="2057426" indent="-228603" algn="l" defTabSz="914411" rtl="0" eaLnBrk="1" latinLnBrk="0" hangingPunct="1">
         <a:lnSpc>
           <a:spcPct val="90000"/>
         </a:lnSpc>
@@ -3855,7 +3865,7 @@
           <a:cs typeface="+mn-cs"/>
         </a:defRPr>
       </a:lvl5pPr>
-      <a:lvl6pPr marL="2514600" indent="-228600" algn="l" defTabSz="914400" rtl="0" eaLnBrk="1" latinLnBrk="0" hangingPunct="1">
+      <a:lvl6pPr marL="2514632" indent="-228603" algn="l" defTabSz="914411" rtl="0" eaLnBrk="1" latinLnBrk="0" hangingPunct="1">
         <a:lnSpc>
           <a:spcPct val="90000"/>
         </a:lnSpc>
@@ -3873,7 +3883,7 @@
           <a:cs typeface="+mn-cs"/>
         </a:defRPr>
       </a:lvl6pPr>
-      <a:lvl7pPr marL="2971800" indent="-228600" algn="l" defTabSz="914400" rtl="0" eaLnBrk="1" latinLnBrk="0" hangingPunct="1">
+      <a:lvl7pPr marL="2971837" indent="-228603" algn="l" defTabSz="914411" rtl="0" eaLnBrk="1" latinLnBrk="0" hangingPunct="1">
         <a:lnSpc>
           <a:spcPct val="90000"/>
         </a:lnSpc>
@@ -3891,7 +3901,7 @@
           <a:cs typeface="+mn-cs"/>
         </a:defRPr>
       </a:lvl7pPr>
-      <a:lvl8pPr marL="3429000" indent="-228600" algn="l" defTabSz="914400" rtl="0" eaLnBrk="1" latinLnBrk="0" hangingPunct="1">
+      <a:lvl8pPr marL="3429043" indent="-228603" algn="l" defTabSz="914411" rtl="0" eaLnBrk="1" latinLnBrk="0" hangingPunct="1">
         <a:lnSpc>
           <a:spcPct val="90000"/>
         </a:lnSpc>
@@ -3909,7 +3919,7 @@
           <a:cs typeface="+mn-cs"/>
         </a:defRPr>
       </a:lvl8pPr>
-      <a:lvl9pPr marL="3886200" indent="-228600" algn="l" defTabSz="914400" rtl="0" eaLnBrk="1" latinLnBrk="0" hangingPunct="1">
+      <a:lvl9pPr marL="3886248" indent="-228603" algn="l" defTabSz="914411" rtl="0" eaLnBrk="1" latinLnBrk="0" hangingPunct="1">
         <a:lnSpc>
           <a:spcPct val="90000"/>
         </a:lnSpc>
@@ -3932,7 +3942,7 @@
       <a:defPPr>
         <a:defRPr lang="en-US"/>
       </a:defPPr>
-      <a:lvl1pPr marL="0" algn="l" defTabSz="914400" rtl="0" eaLnBrk="1" latinLnBrk="0" hangingPunct="1">
+      <a:lvl1pPr marL="0" algn="l" defTabSz="914411" rtl="0" eaLnBrk="1" latinLnBrk="0" hangingPunct="1">
         <a:defRPr sz="1800" kern="1200">
           <a:solidFill>
             <a:schemeClr val="tx1"/>
@@ -3942,7 +3952,7 @@
           <a:cs typeface="+mn-cs"/>
         </a:defRPr>
       </a:lvl1pPr>
-      <a:lvl2pPr marL="457200" algn="l" defTabSz="914400" rtl="0" eaLnBrk="1" latinLnBrk="0" hangingPunct="1">
+      <a:lvl2pPr marL="457206" algn="l" defTabSz="914411" rtl="0" eaLnBrk="1" latinLnBrk="0" hangingPunct="1">
         <a:defRPr sz="1800" kern="1200">
           <a:solidFill>
             <a:schemeClr val="tx1"/>
@@ -3952,7 +3962,7 @@
           <a:cs typeface="+mn-cs"/>
         </a:defRPr>
       </a:lvl2pPr>
-      <a:lvl3pPr marL="914400" algn="l" defTabSz="914400" rtl="0" eaLnBrk="1" latinLnBrk="0" hangingPunct="1">
+      <a:lvl3pPr marL="914411" algn="l" defTabSz="914411" rtl="0" eaLnBrk="1" latinLnBrk="0" hangingPunct="1">
         <a:defRPr sz="1800" kern="1200">
           <a:solidFill>
             <a:schemeClr val="tx1"/>
@@ -3962,7 +3972,7 @@
           <a:cs typeface="+mn-cs"/>
         </a:defRPr>
       </a:lvl3pPr>
-      <a:lvl4pPr marL="1371600" algn="l" defTabSz="914400" rtl="0" eaLnBrk="1" latinLnBrk="0" hangingPunct="1">
+      <a:lvl4pPr marL="1371617" algn="l" defTabSz="914411" rtl="0" eaLnBrk="1" latinLnBrk="0" hangingPunct="1">
         <a:defRPr sz="1800" kern="1200">
           <a:solidFill>
             <a:schemeClr val="tx1"/>
@@ -3972,7 +3982,7 @@
           <a:cs typeface="+mn-cs"/>
         </a:defRPr>
       </a:lvl4pPr>
-      <a:lvl5pPr marL="1828800" algn="l" defTabSz="914400" rtl="0" eaLnBrk="1" latinLnBrk="0" hangingPunct="1">
+      <a:lvl5pPr marL="1828823" algn="l" defTabSz="914411" rtl="0" eaLnBrk="1" latinLnBrk="0" hangingPunct="1">
         <a:defRPr sz="1800" kern="1200">
           <a:solidFill>
             <a:schemeClr val="tx1"/>
@@ -3982,7 +3992,7 @@
           <a:cs typeface="+mn-cs"/>
         </a:defRPr>
       </a:lvl5pPr>
-      <a:lvl6pPr marL="2286000" algn="l" defTabSz="914400" rtl="0" eaLnBrk="1" latinLnBrk="0" hangingPunct="1">
+      <a:lvl6pPr marL="2286029" algn="l" defTabSz="914411" rtl="0" eaLnBrk="1" latinLnBrk="0" hangingPunct="1">
         <a:defRPr sz="1800" kern="1200">
           <a:solidFill>
             <a:schemeClr val="tx1"/>
@@ -3992,7 +4002,7 @@
           <a:cs typeface="+mn-cs"/>
         </a:defRPr>
       </a:lvl6pPr>
-      <a:lvl7pPr marL="2743200" algn="l" defTabSz="914400" rtl="0" eaLnBrk="1" latinLnBrk="0" hangingPunct="1">
+      <a:lvl7pPr marL="2743234" algn="l" defTabSz="914411" rtl="0" eaLnBrk="1" latinLnBrk="0" hangingPunct="1">
         <a:defRPr sz="1800" kern="1200">
           <a:solidFill>
             <a:schemeClr val="tx1"/>
@@ -4002,7 +4012,7 @@
           <a:cs typeface="+mn-cs"/>
         </a:defRPr>
       </a:lvl7pPr>
-      <a:lvl8pPr marL="3200400" algn="l" defTabSz="914400" rtl="0" eaLnBrk="1" latinLnBrk="0" hangingPunct="1">
+      <a:lvl8pPr marL="3200440" algn="l" defTabSz="914411" rtl="0" eaLnBrk="1" latinLnBrk="0" hangingPunct="1">
         <a:defRPr sz="1800" kern="1200">
           <a:solidFill>
             <a:schemeClr val="tx1"/>
@@ -4012,7 +4022,7 @@
           <a:cs typeface="+mn-cs"/>
         </a:defRPr>
       </a:lvl8pPr>
-      <a:lvl9pPr marL="3657600" algn="l" defTabSz="914400" rtl="0" eaLnBrk="1" latinLnBrk="0" hangingPunct="1">
+      <a:lvl9pPr marL="3657646" algn="l" defTabSz="914411" rtl="0" eaLnBrk="1" latinLnBrk="0" hangingPunct="1">
         <a:defRPr sz="1800" kern="1200">
           <a:solidFill>
             <a:schemeClr val="tx1"/>
@@ -4046,10 +4056,10 @@
       </p:grpSpPr>
       <p:graphicFrame>
         <p:nvGraphicFramePr>
-          <p:cNvPr id="6" name="Table 5">
-            <a:extLst>
-              <a:ext uri="{FF2B5EF4-FFF2-40B4-BE49-F238E27FC236}">
-                <a16:creationId xmlns:a16="http://schemas.microsoft.com/office/drawing/2014/main" id="{34B47621-3E40-244E-9BC3-5539EFD738A0}"/>
+          <p:cNvPr id="2" name="Table 2">
+            <a:extLst>
+              <a:ext uri="{FF2B5EF4-FFF2-40B4-BE49-F238E27FC236}">
+                <a16:creationId xmlns:a16="http://schemas.microsoft.com/office/drawing/2014/main" id="{DE7C7C2B-13B4-3C41-BAEE-689034900FE8}"/>
               </a:ext>
             </a:extLst>
           </p:cNvPr>
@@ -4059,94 +4069,162 @@
           <p:nvPr>
             <p:extLst>
               <p:ext uri="{D42A27DB-BD31-4B8C-83A1-F6EECF244321}">
-                <p14:modId xmlns:p14="http://schemas.microsoft.com/office/powerpoint/2010/main" val="3772390026"/>
+                <p14:modId xmlns:p14="http://schemas.microsoft.com/office/powerpoint/2010/main" val="189408420"/>
               </p:ext>
             </p:extLst>
           </p:nvPr>
         </p:nvGraphicFramePr>
         <p:xfrm>
-          <a:off x="2483707" y="1801615"/>
-          <a:ext cx="7630417" cy="3254770"/>
+          <a:off x="2540000" y="2215566"/>
+          <a:ext cx="7112000" cy="2426868"/>
         </p:xfrm>
         <a:graphic>
           <a:graphicData uri="http://schemas.openxmlformats.org/drawingml/2006/table">
             <a:tbl>
-              <a:tblPr/>
+              <a:tblPr firstRow="1" bandRow="1">
+                <a:tableStyleId>{5C22544A-7EE6-4342-B048-85BDC9FD1C3A}</a:tableStyleId>
+              </a:tblPr>
               <a:tblGrid>
-                <a:gridCol w="2563351">
+                <a:gridCol w="1478732">
                   <a:extLst>
                     <a:ext uri="{9D8B030D-6E8A-4147-A177-3AD203B41FA5}">
-                      <a16:colId xmlns:a16="http://schemas.microsoft.com/office/drawing/2014/main" val="484989240"/>
+                      <a16:colId xmlns:a16="http://schemas.microsoft.com/office/drawing/2014/main" val="2932812316"/>
                     </a:ext>
                   </a:extLst>
                 </a:gridCol>
-                <a:gridCol w="2384335">
+                <a:gridCol w="1877756">
                   <a:extLst>
                     <a:ext uri="{9D8B030D-6E8A-4147-A177-3AD203B41FA5}">
-                      <a16:colId xmlns:a16="http://schemas.microsoft.com/office/drawing/2014/main" val="265203838"/>
+                      <a16:colId xmlns:a16="http://schemas.microsoft.com/office/drawing/2014/main" val="3399712298"/>
                     </a:ext>
                   </a:extLst>
                 </a:gridCol>
-                <a:gridCol w="2682731">
+                <a:gridCol w="1877756">
                   <a:extLst>
                     <a:ext uri="{9D8B030D-6E8A-4147-A177-3AD203B41FA5}">
-                      <a16:colId xmlns:a16="http://schemas.microsoft.com/office/drawing/2014/main" val="2371323981"/>
+                      <a16:colId xmlns:a16="http://schemas.microsoft.com/office/drawing/2014/main" val="207520184"/>
+                    </a:ext>
+                  </a:extLst>
+                </a:gridCol>
+                <a:gridCol w="1877756">
+                  <a:extLst>
+                    <a:ext uri="{9D8B030D-6E8A-4147-A177-3AD203B41FA5}">
+                      <a16:colId xmlns:a16="http://schemas.microsoft.com/office/drawing/2014/main" val="704130352"/>
                     </a:ext>
                   </a:extLst>
                 </a:gridCol>
               </a:tblGrid>
-              <a:tr h="482188">
+              <a:tr h="606717">
                 <a:tc>
                   <a:txBody>
                     <a:bodyPr/>
                     <a:lstStyle/>
                     <a:p>
-                      <a:pPr algn="l"/>
-                      <a:r>
-                        <a:rPr lang="en-US" b="0" dirty="0">
-                          <a:solidFill>
-                            <a:srgbClr val="FFFFFF"/>
-                          </a:solidFill>
-                          <a:effectLst/>
-                        </a:rPr>
-                        <a:t>population</a:t>
-                      </a:r>
+                      <a:pPr algn="ctr"/>
+                      <a:endParaRPr lang="en-US" sz="2000" dirty="0"/>
                     </a:p>
                   </a:txBody>
-                  <a:tcPr marL="47625" marR="47625" anchor="ctr">
-                    <a:lnL w="9525" cap="flat" cmpd="sng" algn="ctr">
+                  <a:tcPr anchor="ctr">
+                    <a:lnT w="12700" cap="flat" cmpd="sng" algn="ctr">
                       <a:solidFill>
-                        <a:srgbClr val="0C1F30"/>
+                        <a:schemeClr val="tx1"/>
                       </a:solidFill>
                       <a:prstDash val="solid"/>
                       <a:round/>
                       <a:headEnd type="none" w="med" len="med"/>
                       <a:tailEnd type="none" w="med" len="med"/>
-                    </a:lnL>
-                    <a:lnR w="9525" cap="flat" cmpd="sng" algn="ctr">
+                    </a:lnT>
+                    <a:noFill/>
+                  </a:tcPr>
+                </a:tc>
+                <a:tc gridSpan="3">
+                  <a:txBody>
+                    <a:bodyPr/>
+                    <a:lstStyle/>
+                    <a:p>
+                      <a:pPr algn="ctr"/>
+                      <a:r>
+                        <a:rPr lang="en-US" sz="2000" b="0" dirty="0">
+                          <a:solidFill>
+                            <a:schemeClr val="tx1"/>
+                          </a:solidFill>
+                        </a:rPr>
+                        <a:t>Mean Treatment Water Temperature (°C ± SD)</a:t>
+                      </a:r>
+                    </a:p>
+                  </a:txBody>
+                  <a:tcPr anchor="ctr">
+                    <a:lnT w="12700" cap="flat" cmpd="sng" algn="ctr">
                       <a:solidFill>
-                        <a:srgbClr val="0C1F30"/>
+                        <a:schemeClr val="tx1"/>
                       </a:solidFill>
                       <a:prstDash val="solid"/>
                       <a:round/>
                       <a:headEnd type="none" w="med" len="med"/>
                       <a:tailEnd type="none" w="med" len="med"/>
-                    </a:lnR>
-                    <a:lnT>
-                      <a:noFill/>
                     </a:lnT>
                     <a:lnB w="12700" cap="flat" cmpd="sng" algn="ctr">
                       <a:solidFill>
-                        <a:srgbClr val="0C1F30"/>
+                        <a:schemeClr val="tx1"/>
                       </a:solidFill>
                       <a:prstDash val="solid"/>
                       <a:round/>
                       <a:headEnd type="none" w="med" len="med"/>
                       <a:tailEnd type="none" w="med" len="med"/>
                     </a:lnB>
-                    <a:solidFill>
-                      <a:srgbClr val="4E5C68"/>
-                    </a:solidFill>
+                    <a:noFill/>
+                  </a:tcPr>
+                </a:tc>
+                <a:tc hMerge="1">
+                  <a:txBody>
+                    <a:bodyPr/>
+                    <a:lstStyle/>
+                    <a:p>
+                      <a:endParaRPr lang="en-US" dirty="0"/>
+                    </a:p>
+                  </a:txBody>
+                  <a:tcPr/>
+                </a:tc>
+                <a:tc hMerge="1">
+                  <a:txBody>
+                    <a:bodyPr/>
+                    <a:lstStyle/>
+                    <a:p>
+                      <a:endParaRPr lang="en-US" dirty="0"/>
+                    </a:p>
+                  </a:txBody>
+                  <a:tcPr/>
+                </a:tc>
+                <a:extLst>
+                  <a:ext uri="{0D108BD9-81ED-4DB2-BD59-A6C34878D82A}">
+                    <a16:rowId xmlns:a16="http://schemas.microsoft.com/office/drawing/2014/main" val="2519855610"/>
+                  </a:ext>
+                </a:extLst>
+              </a:tr>
+              <a:tr h="606717">
+                <a:tc>
+                  <a:txBody>
+                    <a:bodyPr/>
+                    <a:lstStyle/>
+                    <a:p>
+                      <a:pPr algn="ctr"/>
+                      <a:r>
+                        <a:rPr lang="en-US" sz="2000" dirty="0"/>
+                        <a:t>Lake</a:t>
+                      </a:r>
+                    </a:p>
+                  </a:txBody>
+                  <a:tcPr anchor="ctr">
+                    <a:lnB w="12700" cap="flat" cmpd="sng" algn="ctr">
+                      <a:solidFill>
+                        <a:schemeClr val="tx1"/>
+                      </a:solidFill>
+                      <a:prstDash val="solid"/>
+                      <a:round/>
+                      <a:headEnd type="none" w="med" len="med"/>
+                      <a:tailEnd type="none" w="med" len="med"/>
+                    </a:lnB>
+                    <a:noFill/>
                   </a:tcPr>
                 </a:tc>
                 <a:tc>
@@ -4154,52 +4232,33 @@
                     <a:bodyPr/>
                     <a:lstStyle/>
                     <a:p>
-                      <a:pPr algn="l"/>
+                      <a:pPr algn="ctr"/>
                       <a:r>
-                        <a:rPr lang="en-US" b="0" dirty="0">
-                          <a:solidFill>
-                            <a:srgbClr val="FFFFFF"/>
-                          </a:solidFill>
-                          <a:effectLst/>
-                        </a:rPr>
-                        <a:t>treatment</a:t>
+                        <a:rPr lang="en-US" sz="2000" dirty="0"/>
+                        <a:t>High</a:t>
                       </a:r>
                     </a:p>
                   </a:txBody>
-                  <a:tcPr marL="47625" marR="47625" anchor="ctr">
-                    <a:lnL w="9525" cap="flat" cmpd="sng" algn="ctr">
+                  <a:tcPr anchor="ctr">
+                    <a:lnT w="12700" cap="flat" cmpd="sng" algn="ctr">
                       <a:solidFill>
-                        <a:srgbClr val="0C1F30"/>
+                        <a:schemeClr val="tx1"/>
                       </a:solidFill>
                       <a:prstDash val="solid"/>
                       <a:round/>
                       <a:headEnd type="none" w="med" len="med"/>
                       <a:tailEnd type="none" w="med" len="med"/>
-                    </a:lnL>
-                    <a:lnR w="9525" cap="flat" cmpd="sng" algn="ctr">
-                      <a:solidFill>
-                        <a:srgbClr val="0C1F30"/>
-                      </a:solidFill>
-                      <a:prstDash val="solid"/>
-                      <a:round/>
-                      <a:headEnd type="none" w="med" len="med"/>
-                      <a:tailEnd type="none" w="med" len="med"/>
-                    </a:lnR>
-                    <a:lnT>
-                      <a:noFill/>
                     </a:lnT>
                     <a:lnB w="12700" cap="flat" cmpd="sng" algn="ctr">
                       <a:solidFill>
-                        <a:srgbClr val="0C1F30"/>
+                        <a:schemeClr val="tx1"/>
                       </a:solidFill>
                       <a:prstDash val="solid"/>
                       <a:round/>
                       <a:headEnd type="none" w="med" len="med"/>
                       <a:tailEnd type="none" w="med" len="med"/>
                     </a:lnB>
-                    <a:solidFill>
-                      <a:srgbClr val="4E5C68"/>
-                    </a:solidFill>
+                    <a:noFill/>
                   </a:tcPr>
                 </a:tc>
                 <a:tc>
@@ -4207,120 +4266,33 @@
                     <a:bodyPr/>
                     <a:lstStyle/>
                     <a:p>
-                      <a:pPr algn="l"/>
+                      <a:pPr algn="ctr"/>
                       <a:r>
-                        <a:rPr lang="en-US" b="0" dirty="0" err="1">
-                          <a:solidFill>
-                            <a:srgbClr val="FFFFFF"/>
-                          </a:solidFill>
-                          <a:effectLst/>
-                        </a:rPr>
-                        <a:t>mean.temp.c</a:t>
+                        <a:rPr lang="en-US" sz="2000" dirty="0"/>
+                        <a:t>Medium</a:t>
                       </a:r>
-                      <a:endParaRPr lang="en-US" b="0" dirty="0">
-                        <a:solidFill>
-                          <a:srgbClr val="FFFFFF"/>
-                        </a:solidFill>
-                        <a:effectLst/>
-                      </a:endParaRPr>
                     </a:p>
                   </a:txBody>
-                  <a:tcPr marL="47625" marR="47625" anchor="ctr">
-                    <a:lnL w="9525" cap="flat" cmpd="sng" algn="ctr">
+                  <a:tcPr anchor="ctr">
+                    <a:lnT w="12700" cap="flat" cmpd="sng" algn="ctr">
                       <a:solidFill>
-                        <a:srgbClr val="0C1F30"/>
+                        <a:schemeClr val="tx1"/>
                       </a:solidFill>
                       <a:prstDash val="solid"/>
                       <a:round/>
                       <a:headEnd type="none" w="med" len="med"/>
                       <a:tailEnd type="none" w="med" len="med"/>
-                    </a:lnL>
-                    <a:lnR w="9525" cap="flat" cmpd="sng" algn="ctr">
-                      <a:solidFill>
-                        <a:srgbClr val="0C1F30"/>
-                      </a:solidFill>
-                      <a:prstDash val="solid"/>
-                      <a:round/>
-                      <a:headEnd type="none" w="med" len="med"/>
-                      <a:tailEnd type="none" w="med" len="med"/>
-                    </a:lnR>
-                    <a:lnT>
-                      <a:noFill/>
                     </a:lnT>
                     <a:lnB w="12700" cap="flat" cmpd="sng" algn="ctr">
                       <a:solidFill>
-                        <a:srgbClr val="0C1F30"/>
+                        <a:schemeClr val="tx1"/>
                       </a:solidFill>
                       <a:prstDash val="solid"/>
                       <a:round/>
                       <a:headEnd type="none" w="med" len="med"/>
                       <a:tailEnd type="none" w="med" len="med"/>
                     </a:lnB>
-                    <a:solidFill>
-                      <a:srgbClr val="4E5C68"/>
-                    </a:solidFill>
-                  </a:tcPr>
-                </a:tc>
-                <a:extLst>
-                  <a:ext uri="{0D108BD9-81ED-4DB2-BD59-A6C34878D82A}">
-                    <a16:rowId xmlns:a16="http://schemas.microsoft.com/office/drawing/2014/main" val="800243404"/>
-                  </a:ext>
-                </a:extLst>
-              </a:tr>
-              <a:tr h="462097">
-                <a:tc>
-                  <a:txBody>
-                    <a:bodyPr/>
-                    <a:lstStyle/>
-                    <a:p>
-                      <a:r>
-                        <a:rPr lang="en-US" dirty="0" err="1">
-                          <a:effectLst/>
-                        </a:rPr>
-                        <a:t>ontario</a:t>
-                      </a:r>
-                      <a:endParaRPr lang="en-US" dirty="0">
-                        <a:effectLst/>
-                      </a:endParaRPr>
-                    </a:p>
-                  </a:txBody>
-                  <a:tcPr marL="47625" marR="47625" marT="38100" marB="38100" anchor="ctr">
-                    <a:lnL w="9525" cap="flat" cmpd="sng" algn="ctr">
-                      <a:solidFill>
-                        <a:srgbClr val="0C1F30"/>
-                      </a:solidFill>
-                      <a:prstDash val="solid"/>
-                      <a:round/>
-                      <a:headEnd type="none" w="med" len="med"/>
-                      <a:tailEnd type="none" w="med" len="med"/>
-                    </a:lnL>
-                    <a:lnR w="9525" cap="flat" cmpd="sng" algn="ctr">
-                      <a:solidFill>
-                        <a:srgbClr val="0C1F30"/>
-                      </a:solidFill>
-                      <a:prstDash val="solid"/>
-                      <a:round/>
-                      <a:headEnd type="none" w="med" len="med"/>
-                      <a:tailEnd type="none" w="med" len="med"/>
-                    </a:lnR>
-                    <a:lnT w="12700" cap="flat" cmpd="sng" algn="ctr">
-                      <a:solidFill>
-                        <a:srgbClr val="0C1F30"/>
-                      </a:solidFill>
-                      <a:prstDash val="solid"/>
-                      <a:round/>
-                      <a:headEnd type="none" w="med" len="med"/>
-                      <a:tailEnd type="none" w="med" len="med"/>
-                    </a:lnT>
-                    <a:lnB w="9525" cap="flat" cmpd="sng" algn="ctr">
-                      <a:solidFill>
-                        <a:srgbClr val="0C1F30"/>
-                      </a:solidFill>
-                      <a:prstDash val="solid"/>
-                      <a:round/>
-                      <a:headEnd type="none" w="med" len="med"/>
-                      <a:tailEnd type="none" w="med" len="med"/>
-                    </a:lnB>
+                    <a:noFill/>
                   </a:tcPr>
                 </a:tc>
                 <a:tc>
@@ -4328,51 +4300,65 @@
                     <a:bodyPr/>
                     <a:lstStyle/>
                     <a:p>
+                      <a:pPr algn="ctr"/>
                       <a:r>
-                        <a:rPr lang="en-US">
-                          <a:effectLst/>
-                        </a:rPr>
-                        <a:t>high</a:t>
+                        <a:rPr lang="en-US" sz="2000" dirty="0"/>
+                        <a:t>Low</a:t>
                       </a:r>
                     </a:p>
                   </a:txBody>
-                  <a:tcPr marL="47625" marR="47625" marT="38100" marB="38100" anchor="ctr">
-                    <a:lnL w="9525" cap="flat" cmpd="sng" algn="ctr">
-                      <a:solidFill>
-                        <a:srgbClr val="0C1F30"/>
-                      </a:solidFill>
-                      <a:prstDash val="solid"/>
-                      <a:round/>
-                      <a:headEnd type="none" w="med" len="med"/>
-                      <a:tailEnd type="none" w="med" len="med"/>
-                    </a:lnL>
-                    <a:lnR w="9525" cap="flat" cmpd="sng" algn="ctr">
-                      <a:solidFill>
-                        <a:srgbClr val="0C1F30"/>
-                      </a:solidFill>
-                      <a:prstDash val="solid"/>
-                      <a:round/>
-                      <a:headEnd type="none" w="med" len="med"/>
-                      <a:tailEnd type="none" w="med" len="med"/>
-                    </a:lnR>
+                  <a:tcPr anchor="ctr">
                     <a:lnT w="12700" cap="flat" cmpd="sng" algn="ctr">
                       <a:solidFill>
-                        <a:srgbClr val="0C1F30"/>
+                        <a:schemeClr val="tx1"/>
                       </a:solidFill>
                       <a:prstDash val="solid"/>
                       <a:round/>
                       <a:headEnd type="none" w="med" len="med"/>
                       <a:tailEnd type="none" w="med" len="med"/>
                     </a:lnT>
-                    <a:lnB w="9525" cap="flat" cmpd="sng" algn="ctr">
+                    <a:lnB w="12700" cap="flat" cmpd="sng" algn="ctr">
                       <a:solidFill>
-                        <a:srgbClr val="0C1F30"/>
+                        <a:schemeClr val="tx1"/>
                       </a:solidFill>
                       <a:prstDash val="solid"/>
                       <a:round/>
                       <a:headEnd type="none" w="med" len="med"/>
                       <a:tailEnd type="none" w="med" len="med"/>
                     </a:lnB>
+                    <a:noFill/>
+                  </a:tcPr>
+                </a:tc>
+                <a:extLst>
+                  <a:ext uri="{0D108BD9-81ED-4DB2-BD59-A6C34878D82A}">
+                    <a16:rowId xmlns:a16="http://schemas.microsoft.com/office/drawing/2014/main" val="3509817329"/>
+                  </a:ext>
+                </a:extLst>
+              </a:tr>
+              <a:tr h="606717">
+                <a:tc>
+                  <a:txBody>
+                    <a:bodyPr/>
+                    <a:lstStyle/>
+                    <a:p>
+                      <a:pPr algn="ctr"/>
+                      <a:r>
+                        <a:rPr lang="en-US" sz="2000" dirty="0"/>
+                        <a:t>Ontario</a:t>
+                      </a:r>
+                    </a:p>
+                  </a:txBody>
+                  <a:tcPr anchor="ctr">
+                    <a:lnT w="12700" cap="flat" cmpd="sng" algn="ctr">
+                      <a:solidFill>
+                        <a:schemeClr val="tx1"/>
+                      </a:solidFill>
+                      <a:prstDash val="solid"/>
+                      <a:round/>
+                      <a:headEnd type="none" w="med" len="med"/>
+                      <a:tailEnd type="none" w="med" len="med"/>
+                    </a:lnT>
+                    <a:noFill/>
                   </a:tcPr>
                 </a:tc>
                 <a:tc>
@@ -4380,114 +4366,27 @@
                     <a:bodyPr/>
                     <a:lstStyle/>
                     <a:p>
-                      <a:pPr algn="r"/>
+                      <a:pPr algn="ctr"/>
                       <a:r>
-                        <a:rPr lang="en-US" dirty="0">
+                        <a:rPr lang="en-US" sz="2000" dirty="0">
                           <a:effectLst/>
                         </a:rPr>
                         <a:t>4.235059</a:t>
                       </a:r>
+                      <a:endParaRPr lang="en-US" sz="2000" dirty="0"/>
                     </a:p>
                   </a:txBody>
-                  <a:tcPr marL="47625" marR="47625" marT="38100" marB="38100" anchor="ctr">
-                    <a:lnL w="9525" cap="flat" cmpd="sng" algn="ctr">
-                      <a:solidFill>
-                        <a:srgbClr val="0C1F30"/>
-                      </a:solidFill>
-                      <a:prstDash val="solid"/>
-                      <a:round/>
-                      <a:headEnd type="none" w="med" len="med"/>
-                      <a:tailEnd type="none" w="med" len="med"/>
-                    </a:lnL>
-                    <a:lnR w="9525" cap="flat" cmpd="sng" algn="ctr">
-                      <a:solidFill>
-                        <a:srgbClr val="0C1F30"/>
-                      </a:solidFill>
-                      <a:prstDash val="solid"/>
-                      <a:round/>
-                      <a:headEnd type="none" w="med" len="med"/>
-                      <a:tailEnd type="none" w="med" len="med"/>
-                    </a:lnR>
+                  <a:tcPr anchor="ctr">
                     <a:lnT w="12700" cap="flat" cmpd="sng" algn="ctr">
                       <a:solidFill>
-                        <a:srgbClr val="0C1F30"/>
+                        <a:schemeClr val="tx1"/>
                       </a:solidFill>
                       <a:prstDash val="solid"/>
                       <a:round/>
                       <a:headEnd type="none" w="med" len="med"/>
                       <a:tailEnd type="none" w="med" len="med"/>
                     </a:lnT>
-                    <a:lnB w="9525" cap="flat" cmpd="sng" algn="ctr">
-                      <a:solidFill>
-                        <a:srgbClr val="0C1F30"/>
-                      </a:solidFill>
-                      <a:prstDash val="solid"/>
-                      <a:round/>
-                      <a:headEnd type="none" w="med" len="med"/>
-                      <a:tailEnd type="none" w="med" len="med"/>
-                    </a:lnB>
-                  </a:tcPr>
-                </a:tc>
-                <a:extLst>
-                  <a:ext uri="{0D108BD9-81ED-4DB2-BD59-A6C34878D82A}">
-                    <a16:rowId xmlns:a16="http://schemas.microsoft.com/office/drawing/2014/main" val="3136512414"/>
-                  </a:ext>
-                </a:extLst>
-              </a:tr>
-              <a:tr h="462097">
-                <a:tc>
-                  <a:txBody>
-                    <a:bodyPr/>
-                    <a:lstStyle/>
-                    <a:p>
-                      <a:r>
-                        <a:rPr lang="en-US" dirty="0" err="1">
-                          <a:effectLst/>
-                        </a:rPr>
-                        <a:t>ontario</a:t>
-                      </a:r>
-                      <a:endParaRPr lang="en-US" dirty="0">
-                        <a:effectLst/>
-                      </a:endParaRPr>
-                    </a:p>
-                  </a:txBody>
-                  <a:tcPr marL="47625" marR="47625" marT="38100" marB="38100" anchor="ctr">
-                    <a:lnL w="9525" cap="flat" cmpd="sng" algn="ctr">
-                      <a:solidFill>
-                        <a:srgbClr val="0C1F30"/>
-                      </a:solidFill>
-                      <a:prstDash val="solid"/>
-                      <a:round/>
-                      <a:headEnd type="none" w="med" len="med"/>
-                      <a:tailEnd type="none" w="med" len="med"/>
-                    </a:lnL>
-                    <a:lnR w="9525" cap="flat" cmpd="sng" algn="ctr">
-                      <a:solidFill>
-                        <a:srgbClr val="0C1F30"/>
-                      </a:solidFill>
-                      <a:prstDash val="solid"/>
-                      <a:round/>
-                      <a:headEnd type="none" w="med" len="med"/>
-                      <a:tailEnd type="none" w="med" len="med"/>
-                    </a:lnR>
-                    <a:lnT w="9525" cap="flat" cmpd="sng" algn="ctr">
-                      <a:solidFill>
-                        <a:srgbClr val="0C1F30"/>
-                      </a:solidFill>
-                      <a:prstDash val="solid"/>
-                      <a:round/>
-                      <a:headEnd type="none" w="med" len="med"/>
-                      <a:tailEnd type="none" w="med" len="med"/>
-                    </a:lnT>
-                    <a:lnB w="9525" cap="flat" cmpd="sng" algn="ctr">
-                      <a:solidFill>
-                        <a:srgbClr val="0C1F30"/>
-                      </a:solidFill>
-                      <a:prstDash val="solid"/>
-                      <a:round/>
-                      <a:headEnd type="none" w="med" len="med"/>
-                      <a:tailEnd type="none" w="med" len="med"/>
-                    </a:lnB>
+                    <a:noFill/>
                   </a:tcPr>
                 </a:tc>
                 <a:tc>
@@ -4495,51 +4394,27 @@
                     <a:bodyPr/>
                     <a:lstStyle/>
                     <a:p>
+                      <a:pPr algn="ctr"/>
                       <a:r>
-                        <a:rPr lang="en-US" dirty="0">
+                        <a:rPr lang="en-US" sz="2000" dirty="0">
                           <a:effectLst/>
                         </a:rPr>
-                        <a:t>medium</a:t>
+                        <a:t>4.276868</a:t>
                       </a:r>
+                      <a:endParaRPr lang="en-US" sz="2000" dirty="0"/>
                     </a:p>
                   </a:txBody>
-                  <a:tcPr marL="47625" marR="47625" marT="38100" marB="38100" anchor="ctr">
-                    <a:lnL w="9525" cap="flat" cmpd="sng" algn="ctr">
+                  <a:tcPr anchor="ctr">
+                    <a:lnT w="12700" cap="flat" cmpd="sng" algn="ctr">
                       <a:solidFill>
-                        <a:srgbClr val="0C1F30"/>
-                      </a:solidFill>
-                      <a:prstDash val="solid"/>
-                      <a:round/>
-                      <a:headEnd type="none" w="med" len="med"/>
-                      <a:tailEnd type="none" w="med" len="med"/>
-                    </a:lnL>
-                    <a:lnR w="9525" cap="flat" cmpd="sng" algn="ctr">
-                      <a:solidFill>
-                        <a:srgbClr val="0C1F30"/>
-                      </a:solidFill>
-                      <a:prstDash val="solid"/>
-                      <a:round/>
-                      <a:headEnd type="none" w="med" len="med"/>
-                      <a:tailEnd type="none" w="med" len="med"/>
-                    </a:lnR>
-                    <a:lnT w="9525" cap="flat" cmpd="sng" algn="ctr">
-                      <a:solidFill>
-                        <a:srgbClr val="0C1F30"/>
+                        <a:schemeClr val="tx1"/>
                       </a:solidFill>
                       <a:prstDash val="solid"/>
                       <a:round/>
                       <a:headEnd type="none" w="med" len="med"/>
                       <a:tailEnd type="none" w="med" len="med"/>
                     </a:lnT>
-                    <a:lnB w="9525" cap="flat" cmpd="sng" algn="ctr">
-                      <a:solidFill>
-                        <a:srgbClr val="0C1F30"/>
-                      </a:solidFill>
-                      <a:prstDash val="solid"/>
-                      <a:round/>
-                      <a:headEnd type="none" w="med" len="med"/>
-                      <a:tailEnd type="none" w="med" len="med"/>
-                    </a:lnB>
+                    <a:noFill/>
                   </a:tcPr>
                 </a:tc>
                 <a:tc>
@@ -4547,114 +4422,59 @@
                     <a:bodyPr/>
                     <a:lstStyle/>
                     <a:p>
-                      <a:pPr algn="r"/>
+                      <a:pPr algn="ctr"/>
                       <a:r>
-                        <a:rPr lang="en-US" dirty="0">
+                        <a:rPr lang="en-US" sz="2000" dirty="0">
                           <a:effectLst/>
                         </a:rPr>
-                        <a:t>4.276868</a:t>
+                        <a:t>4.355195</a:t>
                       </a:r>
+                      <a:endParaRPr lang="en-US" sz="2000" dirty="0"/>
                     </a:p>
                   </a:txBody>
-                  <a:tcPr marL="47625" marR="47625" marT="38100" marB="38100" anchor="ctr">
-                    <a:lnL w="9525" cap="flat" cmpd="sng" algn="ctr">
+                  <a:tcPr anchor="ctr">
+                    <a:lnT w="12700" cap="flat" cmpd="sng" algn="ctr">
                       <a:solidFill>
-                        <a:srgbClr val="0C1F30"/>
-                      </a:solidFill>
-                      <a:prstDash val="solid"/>
-                      <a:round/>
-                      <a:headEnd type="none" w="med" len="med"/>
-                      <a:tailEnd type="none" w="med" len="med"/>
-                    </a:lnL>
-                    <a:lnR w="9525" cap="flat" cmpd="sng" algn="ctr">
-                      <a:solidFill>
-                        <a:srgbClr val="0C1F30"/>
-                      </a:solidFill>
-                      <a:prstDash val="solid"/>
-                      <a:round/>
-                      <a:headEnd type="none" w="med" len="med"/>
-                      <a:tailEnd type="none" w="med" len="med"/>
-                    </a:lnR>
-                    <a:lnT w="9525" cap="flat" cmpd="sng" algn="ctr">
-                      <a:solidFill>
-                        <a:srgbClr val="0C1F30"/>
+                        <a:schemeClr val="tx1"/>
                       </a:solidFill>
                       <a:prstDash val="solid"/>
                       <a:round/>
                       <a:headEnd type="none" w="med" len="med"/>
                       <a:tailEnd type="none" w="med" len="med"/>
                     </a:lnT>
-                    <a:lnB w="9525" cap="flat" cmpd="sng" algn="ctr">
+                    <a:noFill/>
+                  </a:tcPr>
+                </a:tc>
+                <a:extLst>
+                  <a:ext uri="{0D108BD9-81ED-4DB2-BD59-A6C34878D82A}">
+                    <a16:rowId xmlns:a16="http://schemas.microsoft.com/office/drawing/2014/main" val="2814674082"/>
+                  </a:ext>
+                </a:extLst>
+              </a:tr>
+              <a:tr h="606717">
+                <a:tc>
+                  <a:txBody>
+                    <a:bodyPr/>
+                    <a:lstStyle/>
+                    <a:p>
+                      <a:pPr algn="ctr"/>
+                      <a:r>
+                        <a:rPr lang="en-US" sz="2000" dirty="0"/>
+                        <a:t>Superior</a:t>
+                      </a:r>
+                    </a:p>
+                  </a:txBody>
+                  <a:tcPr anchor="ctr">
+                    <a:lnB w="12700" cap="flat" cmpd="sng" algn="ctr">
                       <a:solidFill>
-                        <a:srgbClr val="0C1F30"/>
+                        <a:schemeClr val="tx1"/>
                       </a:solidFill>
                       <a:prstDash val="solid"/>
                       <a:round/>
                       <a:headEnd type="none" w="med" len="med"/>
                       <a:tailEnd type="none" w="med" len="med"/>
                     </a:lnB>
-                  </a:tcPr>
-                </a:tc>
-                <a:extLst>
-                  <a:ext uri="{0D108BD9-81ED-4DB2-BD59-A6C34878D82A}">
-                    <a16:rowId xmlns:a16="http://schemas.microsoft.com/office/drawing/2014/main" val="261941007"/>
-                  </a:ext>
-                </a:extLst>
-              </a:tr>
-              <a:tr h="462097">
-                <a:tc>
-                  <a:txBody>
-                    <a:bodyPr/>
-                    <a:lstStyle/>
-                    <a:p>
-                      <a:r>
-                        <a:rPr lang="en-US" dirty="0" err="1">
-                          <a:effectLst/>
-                        </a:rPr>
-                        <a:t>ontario</a:t>
-                      </a:r>
-                      <a:endParaRPr lang="en-US" dirty="0">
-                        <a:effectLst/>
-                      </a:endParaRPr>
-                    </a:p>
-                  </a:txBody>
-                  <a:tcPr marL="47625" marR="47625" marT="38100" marB="38100" anchor="ctr">
-                    <a:lnL w="9525" cap="flat" cmpd="sng" algn="ctr">
-                      <a:solidFill>
-                        <a:srgbClr val="0C1F30"/>
-                      </a:solidFill>
-                      <a:prstDash val="solid"/>
-                      <a:round/>
-                      <a:headEnd type="none" w="med" len="med"/>
-                      <a:tailEnd type="none" w="med" len="med"/>
-                    </a:lnL>
-                    <a:lnR w="9525" cap="flat" cmpd="sng" algn="ctr">
-                      <a:solidFill>
-                        <a:srgbClr val="0C1F30"/>
-                      </a:solidFill>
-                      <a:prstDash val="solid"/>
-                      <a:round/>
-                      <a:headEnd type="none" w="med" len="med"/>
-                      <a:tailEnd type="none" w="med" len="med"/>
-                    </a:lnR>
-                    <a:lnT w="9525" cap="flat" cmpd="sng" algn="ctr">
-                      <a:solidFill>
-                        <a:srgbClr val="0C1F30"/>
-                      </a:solidFill>
-                      <a:prstDash val="solid"/>
-                      <a:round/>
-                      <a:headEnd type="none" w="med" len="med"/>
-                      <a:tailEnd type="none" w="med" len="med"/>
-                    </a:lnT>
-                    <a:lnB w="9525" cap="flat" cmpd="sng" algn="ctr">
-                      <a:solidFill>
-                        <a:srgbClr val="0C1F30"/>
-                      </a:solidFill>
-                      <a:prstDash val="solid"/>
-                      <a:round/>
-                      <a:headEnd type="none" w="med" len="med"/>
-                      <a:tailEnd type="none" w="med" len="med"/>
-                    </a:lnB>
+                    <a:noFill/>
                   </a:tcPr>
                 </a:tc>
                 <a:tc>
@@ -4662,51 +4482,27 @@
                     <a:bodyPr/>
                     <a:lstStyle/>
                     <a:p>
+                      <a:pPr algn="ctr"/>
                       <a:r>
-                        <a:rPr lang="en-US" dirty="0">
+                        <a:rPr lang="en-US" sz="2000" dirty="0">
                           <a:effectLst/>
                         </a:rPr>
-                        <a:t>low</a:t>
+                        <a:t>4.250879</a:t>
                       </a:r>
+                      <a:endParaRPr lang="en-US" sz="2000" dirty="0"/>
                     </a:p>
                   </a:txBody>
-                  <a:tcPr marL="47625" marR="47625" marT="38100" marB="38100" anchor="ctr">
-                    <a:lnL w="9525" cap="flat" cmpd="sng" algn="ctr">
+                  <a:tcPr anchor="ctr">
+                    <a:lnB w="12700" cap="flat" cmpd="sng" algn="ctr">
                       <a:solidFill>
-                        <a:srgbClr val="0C1F30"/>
-                      </a:solidFill>
-                      <a:prstDash val="solid"/>
-                      <a:round/>
-                      <a:headEnd type="none" w="med" len="med"/>
-                      <a:tailEnd type="none" w="med" len="med"/>
-                    </a:lnL>
-                    <a:lnR w="9525" cap="flat" cmpd="sng" algn="ctr">
-                      <a:solidFill>
-                        <a:srgbClr val="0C1F30"/>
-                      </a:solidFill>
-                      <a:prstDash val="solid"/>
-                      <a:round/>
-                      <a:headEnd type="none" w="med" len="med"/>
-                      <a:tailEnd type="none" w="med" len="med"/>
-                    </a:lnR>
-                    <a:lnT w="9525" cap="flat" cmpd="sng" algn="ctr">
-                      <a:solidFill>
-                        <a:srgbClr val="0C1F30"/>
-                      </a:solidFill>
-                      <a:prstDash val="solid"/>
-                      <a:round/>
-                      <a:headEnd type="none" w="med" len="med"/>
-                      <a:tailEnd type="none" w="med" len="med"/>
-                    </a:lnT>
-                    <a:lnB w="9525" cap="flat" cmpd="sng" algn="ctr">
-                      <a:solidFill>
-                        <a:srgbClr val="0C1F30"/>
+                        <a:schemeClr val="tx1"/>
                       </a:solidFill>
                       <a:prstDash val="solid"/>
                       <a:round/>
                       <a:headEnd type="none" w="med" len="med"/>
                       <a:tailEnd type="none" w="med" len="med"/>
                     </a:lnB>
+                    <a:noFill/>
                   </a:tcPr>
                 </a:tc>
                 <a:tc>
@@ -4714,111 +4510,27 @@
                     <a:bodyPr/>
                     <a:lstStyle/>
                     <a:p>
-                      <a:pPr algn="r"/>
+                      <a:pPr algn="ctr"/>
                       <a:r>
-                        <a:rPr lang="en-US" dirty="0">
+                        <a:rPr lang="en-US" sz="2000" dirty="0">
                           <a:effectLst/>
                         </a:rPr>
-                        <a:t>4.355195</a:t>
+                        <a:t>4.279827</a:t>
                       </a:r>
+                      <a:endParaRPr lang="en-US" sz="2000" dirty="0"/>
                     </a:p>
                   </a:txBody>
-                  <a:tcPr marL="47625" marR="47625" marT="38100" marB="38100" anchor="ctr">
-                    <a:lnL w="9525" cap="flat" cmpd="sng" algn="ctr">
+                  <a:tcPr anchor="ctr">
+                    <a:lnB w="12700" cap="flat" cmpd="sng" algn="ctr">
                       <a:solidFill>
-                        <a:srgbClr val="0C1F30"/>
-                      </a:solidFill>
-                      <a:prstDash val="solid"/>
-                      <a:round/>
-                      <a:headEnd type="none" w="med" len="med"/>
-                      <a:tailEnd type="none" w="med" len="med"/>
-                    </a:lnL>
-                    <a:lnR w="9525" cap="flat" cmpd="sng" algn="ctr">
-                      <a:solidFill>
-                        <a:srgbClr val="0C1F30"/>
-                      </a:solidFill>
-                      <a:prstDash val="solid"/>
-                      <a:round/>
-                      <a:headEnd type="none" w="med" len="med"/>
-                      <a:tailEnd type="none" w="med" len="med"/>
-                    </a:lnR>
-                    <a:lnT w="9525" cap="flat" cmpd="sng" algn="ctr">
-                      <a:solidFill>
-                        <a:srgbClr val="0C1F30"/>
-                      </a:solidFill>
-                      <a:prstDash val="solid"/>
-                      <a:round/>
-                      <a:headEnd type="none" w="med" len="med"/>
-                      <a:tailEnd type="none" w="med" len="med"/>
-                    </a:lnT>
-                    <a:lnB w="9525" cap="flat" cmpd="sng" algn="ctr">
-                      <a:solidFill>
-                        <a:srgbClr val="0C1F30"/>
+                        <a:schemeClr val="tx1"/>
                       </a:solidFill>
                       <a:prstDash val="solid"/>
                       <a:round/>
                       <a:headEnd type="none" w="med" len="med"/>
                       <a:tailEnd type="none" w="med" len="med"/>
                     </a:lnB>
-                  </a:tcPr>
-                </a:tc>
-                <a:extLst>
-                  <a:ext uri="{0D108BD9-81ED-4DB2-BD59-A6C34878D82A}">
-                    <a16:rowId xmlns:a16="http://schemas.microsoft.com/office/drawing/2014/main" val="1648088254"/>
-                  </a:ext>
-                </a:extLst>
-              </a:tr>
-              <a:tr h="462097">
-                <a:tc>
-                  <a:txBody>
-                    <a:bodyPr/>
-                    <a:lstStyle/>
-                    <a:p>
-                      <a:r>
-                        <a:rPr lang="en-US">
-                          <a:effectLst/>
-                        </a:rPr>
-                        <a:t>superior</a:t>
-                      </a:r>
-                    </a:p>
-                  </a:txBody>
-                  <a:tcPr marL="47625" marR="47625" marT="38100" marB="38100" anchor="ctr">
-                    <a:lnL w="9525" cap="flat" cmpd="sng" algn="ctr">
-                      <a:solidFill>
-                        <a:srgbClr val="0C1F30"/>
-                      </a:solidFill>
-                      <a:prstDash val="solid"/>
-                      <a:round/>
-                      <a:headEnd type="none" w="med" len="med"/>
-                      <a:tailEnd type="none" w="med" len="med"/>
-                    </a:lnL>
-                    <a:lnR w="9525" cap="flat" cmpd="sng" algn="ctr">
-                      <a:solidFill>
-                        <a:srgbClr val="0C1F30"/>
-                      </a:solidFill>
-                      <a:prstDash val="solid"/>
-                      <a:round/>
-                      <a:headEnd type="none" w="med" len="med"/>
-                      <a:tailEnd type="none" w="med" len="med"/>
-                    </a:lnR>
-                    <a:lnT w="9525" cap="flat" cmpd="sng" algn="ctr">
-                      <a:solidFill>
-                        <a:srgbClr val="0C1F30"/>
-                      </a:solidFill>
-                      <a:prstDash val="solid"/>
-                      <a:round/>
-                      <a:headEnd type="none" w="med" len="med"/>
-                      <a:tailEnd type="none" w="med" len="med"/>
-                    </a:lnT>
-                    <a:lnB w="9525" cap="flat" cmpd="sng" algn="ctr">
-                      <a:solidFill>
-                        <a:srgbClr val="0C1F30"/>
-                      </a:solidFill>
-                      <a:prstDash val="solid"/>
-                      <a:round/>
-                      <a:headEnd type="none" w="med" len="med"/>
-                      <a:tailEnd type="none" w="med" len="med"/>
-                    </a:lnB>
+                    <a:noFill/>
                   </a:tcPr>
                 </a:tc>
                 <a:tc>
@@ -4826,437 +4538,32 @@
                     <a:bodyPr/>
                     <a:lstStyle/>
                     <a:p>
+                      <a:pPr algn="ctr"/>
                       <a:r>
-                        <a:rPr lang="en-US" dirty="0">
+                        <a:rPr lang="en-US" sz="2000" dirty="0">
                           <a:effectLst/>
                         </a:rPr>
-                        <a:t>high</a:t>
+                        <a:t>4.279827</a:t>
                       </a:r>
+                      <a:endParaRPr lang="en-US" sz="2000" dirty="0"/>
                     </a:p>
                   </a:txBody>
-                  <a:tcPr marL="47625" marR="47625" marT="38100" marB="38100" anchor="ctr">
-                    <a:lnL w="9525" cap="flat" cmpd="sng" algn="ctr">
+                  <a:tcPr anchor="ctr">
+                    <a:lnB w="12700" cap="flat" cmpd="sng" algn="ctr">
                       <a:solidFill>
-                        <a:srgbClr val="0C1F30"/>
-                      </a:solidFill>
-                      <a:prstDash val="solid"/>
-                      <a:round/>
-                      <a:headEnd type="none" w="med" len="med"/>
-                      <a:tailEnd type="none" w="med" len="med"/>
-                    </a:lnL>
-                    <a:lnR w="9525" cap="flat" cmpd="sng" algn="ctr">
-                      <a:solidFill>
-                        <a:srgbClr val="0C1F30"/>
-                      </a:solidFill>
-                      <a:prstDash val="solid"/>
-                      <a:round/>
-                      <a:headEnd type="none" w="med" len="med"/>
-                      <a:tailEnd type="none" w="med" len="med"/>
-                    </a:lnR>
-                    <a:lnT w="9525" cap="flat" cmpd="sng" algn="ctr">
-                      <a:solidFill>
-                        <a:srgbClr val="0C1F30"/>
-                      </a:solidFill>
-                      <a:prstDash val="solid"/>
-                      <a:round/>
-                      <a:headEnd type="none" w="med" len="med"/>
-                      <a:tailEnd type="none" w="med" len="med"/>
-                    </a:lnT>
-                    <a:lnB w="9525" cap="flat" cmpd="sng" algn="ctr">
-                      <a:solidFill>
-                        <a:srgbClr val="0C1F30"/>
+                        <a:schemeClr val="tx1"/>
                       </a:solidFill>
                       <a:prstDash val="solid"/>
                       <a:round/>
                       <a:headEnd type="none" w="med" len="med"/>
                       <a:tailEnd type="none" w="med" len="med"/>
                     </a:lnB>
-                  </a:tcPr>
-                </a:tc>
-                <a:tc>
-                  <a:txBody>
-                    <a:bodyPr/>
-                    <a:lstStyle/>
-                    <a:p>
-                      <a:pPr algn="r"/>
-                      <a:r>
-                        <a:rPr lang="en-US" dirty="0">
-                          <a:effectLst/>
-                        </a:rPr>
-                        <a:t>4.250879</a:t>
-                      </a:r>
-                    </a:p>
-                  </a:txBody>
-                  <a:tcPr marL="47625" marR="47625" marT="38100" marB="38100" anchor="ctr">
-                    <a:lnL w="9525" cap="flat" cmpd="sng" algn="ctr">
-                      <a:solidFill>
-                        <a:srgbClr val="0C1F30"/>
-                      </a:solidFill>
-                      <a:prstDash val="solid"/>
-                      <a:round/>
-                      <a:headEnd type="none" w="med" len="med"/>
-                      <a:tailEnd type="none" w="med" len="med"/>
-                    </a:lnL>
-                    <a:lnR w="9525" cap="flat" cmpd="sng" algn="ctr">
-                      <a:solidFill>
-                        <a:srgbClr val="0C1F30"/>
-                      </a:solidFill>
-                      <a:prstDash val="solid"/>
-                      <a:round/>
-                      <a:headEnd type="none" w="med" len="med"/>
-                      <a:tailEnd type="none" w="med" len="med"/>
-                    </a:lnR>
-                    <a:lnT w="9525" cap="flat" cmpd="sng" algn="ctr">
-                      <a:solidFill>
-                        <a:srgbClr val="0C1F30"/>
-                      </a:solidFill>
-                      <a:prstDash val="solid"/>
-                      <a:round/>
-                      <a:headEnd type="none" w="med" len="med"/>
-                      <a:tailEnd type="none" w="med" len="med"/>
-                    </a:lnT>
-                    <a:lnB w="9525" cap="flat" cmpd="sng" algn="ctr">
-                      <a:solidFill>
-                        <a:srgbClr val="0C1F30"/>
-                      </a:solidFill>
-                      <a:prstDash val="solid"/>
-                      <a:round/>
-                      <a:headEnd type="none" w="med" len="med"/>
-                      <a:tailEnd type="none" w="med" len="med"/>
-                    </a:lnB>
+                    <a:noFill/>
                   </a:tcPr>
                 </a:tc>
                 <a:extLst>
                   <a:ext uri="{0D108BD9-81ED-4DB2-BD59-A6C34878D82A}">
-                    <a16:rowId xmlns:a16="http://schemas.microsoft.com/office/drawing/2014/main" val="2222800677"/>
-                  </a:ext>
-                </a:extLst>
-              </a:tr>
-              <a:tr h="462097">
-                <a:tc>
-                  <a:txBody>
-                    <a:bodyPr/>
-                    <a:lstStyle/>
-                    <a:p>
-                      <a:r>
-                        <a:rPr lang="en-US" dirty="0">
-                          <a:effectLst/>
-                        </a:rPr>
-                        <a:t>superior</a:t>
-                      </a:r>
-                    </a:p>
-                  </a:txBody>
-                  <a:tcPr marL="47625" marR="47625" marT="38100" marB="38100" anchor="ctr">
-                    <a:lnL w="9525" cap="flat" cmpd="sng" algn="ctr">
-                      <a:solidFill>
-                        <a:srgbClr val="0C1F30"/>
-                      </a:solidFill>
-                      <a:prstDash val="solid"/>
-                      <a:round/>
-                      <a:headEnd type="none" w="med" len="med"/>
-                      <a:tailEnd type="none" w="med" len="med"/>
-                    </a:lnL>
-                    <a:lnR w="9525" cap="flat" cmpd="sng" algn="ctr">
-                      <a:solidFill>
-                        <a:srgbClr val="0C1F30"/>
-                      </a:solidFill>
-                      <a:prstDash val="solid"/>
-                      <a:round/>
-                      <a:headEnd type="none" w="med" len="med"/>
-                      <a:tailEnd type="none" w="med" len="med"/>
-                    </a:lnR>
-                    <a:lnT w="9525" cap="flat" cmpd="sng" algn="ctr">
-                      <a:solidFill>
-                        <a:srgbClr val="0C1F30"/>
-                      </a:solidFill>
-                      <a:prstDash val="solid"/>
-                      <a:round/>
-                      <a:headEnd type="none" w="med" len="med"/>
-                      <a:tailEnd type="none" w="med" len="med"/>
-                    </a:lnT>
-                    <a:lnB w="9525" cap="flat" cmpd="sng" algn="ctr">
-                      <a:solidFill>
-                        <a:srgbClr val="0C1F30"/>
-                      </a:solidFill>
-                      <a:prstDash val="solid"/>
-                      <a:round/>
-                      <a:headEnd type="none" w="med" len="med"/>
-                      <a:tailEnd type="none" w="med" len="med"/>
-                    </a:lnB>
-                  </a:tcPr>
-                </a:tc>
-                <a:tc>
-                  <a:txBody>
-                    <a:bodyPr/>
-                    <a:lstStyle/>
-                    <a:p>
-                      <a:r>
-                        <a:rPr lang="en-US" dirty="0">
-                          <a:effectLst/>
-                        </a:rPr>
-                        <a:t>medium</a:t>
-                      </a:r>
-                    </a:p>
-                  </a:txBody>
-                  <a:tcPr marL="47625" marR="47625" marT="38100" marB="38100" anchor="ctr">
-                    <a:lnL w="9525" cap="flat" cmpd="sng" algn="ctr">
-                      <a:solidFill>
-                        <a:srgbClr val="0C1F30"/>
-                      </a:solidFill>
-                      <a:prstDash val="solid"/>
-                      <a:round/>
-                      <a:headEnd type="none" w="med" len="med"/>
-                      <a:tailEnd type="none" w="med" len="med"/>
-                    </a:lnL>
-                    <a:lnR w="9525" cap="flat" cmpd="sng" algn="ctr">
-                      <a:solidFill>
-                        <a:srgbClr val="0C1F30"/>
-                      </a:solidFill>
-                      <a:prstDash val="solid"/>
-                      <a:round/>
-                      <a:headEnd type="none" w="med" len="med"/>
-                      <a:tailEnd type="none" w="med" len="med"/>
-                    </a:lnR>
-                    <a:lnT w="9525" cap="flat" cmpd="sng" algn="ctr">
-                      <a:solidFill>
-                        <a:srgbClr val="0C1F30"/>
-                      </a:solidFill>
-                      <a:prstDash val="solid"/>
-                      <a:round/>
-                      <a:headEnd type="none" w="med" len="med"/>
-                      <a:tailEnd type="none" w="med" len="med"/>
-                    </a:lnT>
-                    <a:lnB w="9525" cap="flat" cmpd="sng" algn="ctr">
-                      <a:solidFill>
-                        <a:srgbClr val="0C1F30"/>
-                      </a:solidFill>
-                      <a:prstDash val="solid"/>
-                      <a:round/>
-                      <a:headEnd type="none" w="med" len="med"/>
-                      <a:tailEnd type="none" w="med" len="med"/>
-                    </a:lnB>
-                  </a:tcPr>
-                </a:tc>
-                <a:tc>
-                  <a:txBody>
-                    <a:bodyPr/>
-                    <a:lstStyle/>
-                    <a:p>
-                      <a:pPr algn="r"/>
-                      <a:r>
-                        <a:rPr lang="en-US" dirty="0">
-                          <a:effectLst/>
-                        </a:rPr>
-                        <a:t>4.279827</a:t>
-                      </a:r>
-                    </a:p>
-                  </a:txBody>
-                  <a:tcPr marL="47625" marR="47625" marT="38100" marB="38100" anchor="ctr">
-                    <a:lnL w="9525" cap="flat" cmpd="sng" algn="ctr">
-                      <a:solidFill>
-                        <a:srgbClr val="0C1F30"/>
-                      </a:solidFill>
-                      <a:prstDash val="solid"/>
-                      <a:round/>
-                      <a:headEnd type="none" w="med" len="med"/>
-                      <a:tailEnd type="none" w="med" len="med"/>
-                    </a:lnL>
-                    <a:lnR w="9525" cap="flat" cmpd="sng" algn="ctr">
-                      <a:solidFill>
-                        <a:srgbClr val="0C1F30"/>
-                      </a:solidFill>
-                      <a:prstDash val="solid"/>
-                      <a:round/>
-                      <a:headEnd type="none" w="med" len="med"/>
-                      <a:tailEnd type="none" w="med" len="med"/>
-                    </a:lnR>
-                    <a:lnT w="9525" cap="flat" cmpd="sng" algn="ctr">
-                      <a:solidFill>
-                        <a:srgbClr val="0C1F30"/>
-                      </a:solidFill>
-                      <a:prstDash val="solid"/>
-                      <a:round/>
-                      <a:headEnd type="none" w="med" len="med"/>
-                      <a:tailEnd type="none" w="med" len="med"/>
-                    </a:lnT>
-                    <a:lnB w="9525" cap="flat" cmpd="sng" algn="ctr">
-                      <a:solidFill>
-                        <a:srgbClr val="0C1F30"/>
-                      </a:solidFill>
-                      <a:prstDash val="solid"/>
-                      <a:round/>
-                      <a:headEnd type="none" w="med" len="med"/>
-                      <a:tailEnd type="none" w="med" len="med"/>
-                    </a:lnB>
-                  </a:tcPr>
-                </a:tc>
-                <a:extLst>
-                  <a:ext uri="{0D108BD9-81ED-4DB2-BD59-A6C34878D82A}">
-                    <a16:rowId xmlns:a16="http://schemas.microsoft.com/office/drawing/2014/main" val="715492672"/>
-                  </a:ext>
-                </a:extLst>
-              </a:tr>
-              <a:tr h="462097">
-                <a:tc>
-                  <a:txBody>
-                    <a:bodyPr/>
-                    <a:lstStyle/>
-                    <a:p>
-                      <a:r>
-                        <a:rPr lang="en-US" dirty="0">
-                          <a:effectLst/>
-                        </a:rPr>
-                        <a:t>superior</a:t>
-                      </a:r>
-                    </a:p>
-                  </a:txBody>
-                  <a:tcPr marL="47625" marR="47625" marT="38100" marB="38100" anchor="ctr">
-                    <a:lnL w="9525" cap="flat" cmpd="sng" algn="ctr">
-                      <a:solidFill>
-                        <a:srgbClr val="0C1F30"/>
-                      </a:solidFill>
-                      <a:prstDash val="solid"/>
-                      <a:round/>
-                      <a:headEnd type="none" w="med" len="med"/>
-                      <a:tailEnd type="none" w="med" len="med"/>
-                    </a:lnL>
-                    <a:lnR w="9525" cap="flat" cmpd="sng" algn="ctr">
-                      <a:solidFill>
-                        <a:srgbClr val="0C1F30"/>
-                      </a:solidFill>
-                      <a:prstDash val="solid"/>
-                      <a:round/>
-                      <a:headEnd type="none" w="med" len="med"/>
-                      <a:tailEnd type="none" w="med" len="med"/>
-                    </a:lnR>
-                    <a:lnT w="9525" cap="flat" cmpd="sng" algn="ctr">
-                      <a:solidFill>
-                        <a:srgbClr val="0C1F30"/>
-                      </a:solidFill>
-                      <a:prstDash val="solid"/>
-                      <a:round/>
-                      <a:headEnd type="none" w="med" len="med"/>
-                      <a:tailEnd type="none" w="med" len="med"/>
-                    </a:lnT>
-                    <a:lnB w="9525" cap="flat" cmpd="sng" algn="ctr">
-                      <a:solidFill>
-                        <a:srgbClr val="0C1F30"/>
-                      </a:solidFill>
-                      <a:prstDash val="solid"/>
-                      <a:round/>
-                      <a:headEnd type="none" w="med" len="med"/>
-                      <a:tailEnd type="none" w="med" len="med"/>
-                    </a:lnB>
-                  </a:tcPr>
-                </a:tc>
-                <a:tc>
-                  <a:txBody>
-                    <a:bodyPr/>
-                    <a:lstStyle/>
-                    <a:p>
-                      <a:r>
-                        <a:rPr lang="en-US" dirty="0">
-                          <a:effectLst/>
-                        </a:rPr>
-                        <a:t>low</a:t>
-                      </a:r>
-                    </a:p>
-                  </a:txBody>
-                  <a:tcPr marL="47625" marR="47625" marT="38100" marB="38100" anchor="ctr">
-                    <a:lnL w="9525" cap="flat" cmpd="sng" algn="ctr">
-                      <a:solidFill>
-                        <a:srgbClr val="0C1F30"/>
-                      </a:solidFill>
-                      <a:prstDash val="solid"/>
-                      <a:round/>
-                      <a:headEnd type="none" w="med" len="med"/>
-                      <a:tailEnd type="none" w="med" len="med"/>
-                    </a:lnL>
-                    <a:lnR w="9525" cap="flat" cmpd="sng" algn="ctr">
-                      <a:solidFill>
-                        <a:srgbClr val="0C1F30"/>
-                      </a:solidFill>
-                      <a:prstDash val="solid"/>
-                      <a:round/>
-                      <a:headEnd type="none" w="med" len="med"/>
-                      <a:tailEnd type="none" w="med" len="med"/>
-                    </a:lnR>
-                    <a:lnT w="9525" cap="flat" cmpd="sng" algn="ctr">
-                      <a:solidFill>
-                        <a:srgbClr val="0C1F30"/>
-                      </a:solidFill>
-                      <a:prstDash val="solid"/>
-                      <a:round/>
-                      <a:headEnd type="none" w="med" len="med"/>
-                      <a:tailEnd type="none" w="med" len="med"/>
-                    </a:lnT>
-                    <a:lnB w="9525" cap="flat" cmpd="sng" algn="ctr">
-                      <a:solidFill>
-                        <a:srgbClr val="0C1F30"/>
-                      </a:solidFill>
-                      <a:prstDash val="solid"/>
-                      <a:round/>
-                      <a:headEnd type="none" w="med" len="med"/>
-                      <a:tailEnd type="none" w="med" len="med"/>
-                    </a:lnB>
-                  </a:tcPr>
-                </a:tc>
-                <a:tc>
-                  <a:txBody>
-                    <a:bodyPr/>
-                    <a:lstStyle/>
-                    <a:p>
-                      <a:pPr algn="r"/>
-                      <a:r>
-                        <a:rPr lang="en-US" dirty="0">
-                          <a:effectLst/>
-                        </a:rPr>
-                        <a:t>4.336253</a:t>
-                      </a:r>
-                    </a:p>
-                  </a:txBody>
-                  <a:tcPr marL="47625" marR="47625" marT="38100" marB="38100" anchor="ctr">
-                    <a:lnL w="9525" cap="flat" cmpd="sng" algn="ctr">
-                      <a:solidFill>
-                        <a:srgbClr val="0C1F30"/>
-                      </a:solidFill>
-                      <a:prstDash val="solid"/>
-                      <a:round/>
-                      <a:headEnd type="none" w="med" len="med"/>
-                      <a:tailEnd type="none" w="med" len="med"/>
-                    </a:lnL>
-                    <a:lnR w="9525" cap="flat" cmpd="sng" algn="ctr">
-                      <a:solidFill>
-                        <a:srgbClr val="0C1F30"/>
-                      </a:solidFill>
-                      <a:prstDash val="solid"/>
-                      <a:round/>
-                      <a:headEnd type="none" w="med" len="med"/>
-                      <a:tailEnd type="none" w="med" len="med"/>
-                    </a:lnR>
-                    <a:lnT w="9525" cap="flat" cmpd="sng" algn="ctr">
-                      <a:solidFill>
-                        <a:srgbClr val="0C1F30"/>
-                      </a:solidFill>
-                      <a:prstDash val="solid"/>
-                      <a:round/>
-                      <a:headEnd type="none" w="med" len="med"/>
-                      <a:tailEnd type="none" w="med" len="med"/>
-                    </a:lnT>
-                    <a:lnB w="9525" cap="flat" cmpd="sng" algn="ctr">
-                      <a:solidFill>
-                        <a:srgbClr val="0C1F30"/>
-                      </a:solidFill>
-                      <a:prstDash val="solid"/>
-                      <a:round/>
-                      <a:headEnd type="none" w="med" len="med"/>
-                      <a:tailEnd type="none" w="med" len="med"/>
-                    </a:lnB>
-                  </a:tcPr>
-                </a:tc>
-                <a:extLst>
-                  <a:ext uri="{0D108BD9-81ED-4DB2-BD59-A6C34878D82A}">
-                    <a16:rowId xmlns:a16="http://schemas.microsoft.com/office/drawing/2014/main" val="178069528"/>
+                    <a16:rowId xmlns:a16="http://schemas.microsoft.com/office/drawing/2014/main" val="1842966717"/>
                   </a:ext>
                 </a:extLst>
               </a:tr>
@@ -5264,41 +4571,6 @@
           </a:graphicData>
         </a:graphic>
       </p:graphicFrame>
-      <p:sp>
-        <p:nvSpPr>
-          <p:cNvPr id="7" name="TextBox 6">
-            <a:extLst>
-              <a:ext uri="{FF2B5EF4-FFF2-40B4-BE49-F238E27FC236}">
-                <a16:creationId xmlns:a16="http://schemas.microsoft.com/office/drawing/2014/main" id="{CC177579-66FB-EE4F-BCE1-D87C22A7B3F0}"/>
-              </a:ext>
-            </a:extLst>
-          </p:cNvPr>
-          <p:cNvSpPr txBox="1"/>
-          <p:nvPr/>
-        </p:nvSpPr>
-        <p:spPr>
-          <a:xfrm>
-            <a:off x="1940011" y="864973"/>
-            <a:ext cx="2652970" cy="369332"/>
-          </a:xfrm>
-          <a:prstGeom prst="rect">
-            <a:avLst/>
-          </a:prstGeom>
-          <a:noFill/>
-        </p:spPr>
-        <p:txBody>
-          <a:bodyPr wrap="none" rtlCol="0">
-            <a:spAutoFit/>
-          </a:bodyPr>
-          <a:lstStyle/>
-          <a:p>
-            <a:r>
-              <a:rPr lang="en-US" dirty="0"/>
-              <a:t>Mean water temperatures</a:t>
-            </a:r>
-          </a:p>
-        </p:txBody>
-      </p:sp>
     </p:spTree>
     <p:extLst>
       <p:ext uri="{BB962C8B-B14F-4D97-AF65-F5344CB8AC3E}">

</xml_diff>